<commit_message>
add README and finish project
</commit_message>
<xml_diff>
--- a/resources/Welcome to TDD.pptx
+++ b/resources/Welcome to TDD.pptx
@@ -353,7 +353,7 @@
           <a:p>
             <a:fld id="{80680FBE-A8DF-4758-9AC4-3A9E1039168F}" type="datetimeFigureOut">
               <a:rPr lang="en-US" smtClean="0"/>
-              <a:t>11/5/2019</a:t>
+              <a:t>11/6/2019</a:t>
             </a:fld>
             <a:endParaRPr lang="en-US" dirty="0"/>
           </a:p>
@@ -518,7 +518,7 @@
           <a:p>
             <a:fld id="{EC13577B-6902-467D-A26C-08A0DD5E4E03}" type="datetimeFigureOut">
               <a:rPr lang="en-US" smtClean="0"/>
-              <a:t>11/5/2019</a:t>
+              <a:t>11/6/2019</a:t>
             </a:fld>
             <a:endParaRPr lang="en-US" dirty="0"/>
           </a:p>
@@ -834,6 +834,12 @@
           <a:bodyPr/>
           <a:lstStyle/>
           <a:p>
+            <a:r>
+              <a:rPr lang="en-US" dirty="0">
+                <a:hlinkClick r:id="rId3"/>
+              </a:rPr>
+              <a:t>https://medium.com/@stevcooo/code-kata-bowling-game-25ba934614f6</a:t>
+            </a:r>
             <a:endParaRPr lang="en-US" dirty="0"/>
           </a:p>
         </p:txBody>
@@ -7574,7 +7580,7 @@
             <a:fld id="{8BEEBAAA-29B5-4AF5-BC5F-7E580C29002D}" type="datetimeFigureOut">
               <a:rPr lang="en-US" smtClean="0"/>
               <a:pPr/>
-              <a:t>11/5/2019</a:t>
+              <a:t>11/6/2019</a:t>
             </a:fld>
             <a:endParaRPr lang="en-US" dirty="0"/>
           </a:p>
@@ -8407,7 +8413,7 @@
             <a:fld id="{8BEEBAAA-29B5-4AF5-BC5F-7E580C29002D}" type="datetimeFigureOut">
               <a:rPr lang="en-US" smtClean="0"/>
               <a:pPr/>
-              <a:t>11/5/2019</a:t>
+              <a:t>11/6/2019</a:t>
             </a:fld>
             <a:endParaRPr lang="en-US" dirty="0"/>
           </a:p>
@@ -9253,7 +9259,7 @@
           <a:graphicData uri="http://schemas.openxmlformats.org/presentationml/2006/ole">
             <mc:AlternateContent xmlns:mc="http://schemas.openxmlformats.org/markup-compatibility/2006">
               <mc:Choice xmlns:v="urn:schemas-microsoft-com:vml" Requires="v">
-                <p:oleObj spid="_x0000_s7187" name="VISIO" r:id="rId4" imgW="4126680" imgH="2227320" progId="Visio.Drawing.5">
+                <p:oleObj spid="_x0000_s7192" name="VISIO" r:id="rId4" imgW="4126680" imgH="2227320" progId="Visio.Drawing.5">
                   <p:embed/>
                 </p:oleObj>
               </mc:Choice>
@@ -9560,7 +9566,7 @@
           <a:graphicData uri="http://schemas.openxmlformats.org/presentationml/2006/ole">
             <mc:AlternateContent xmlns:mc="http://schemas.openxmlformats.org/markup-compatibility/2006">
               <mc:Choice xmlns:v="urn:schemas-microsoft-com:vml" Requires="v">
-                <p:oleObj spid="_x0000_s8211" name="VISIO" r:id="rId4" imgW="4126680" imgH="2227320" progId="Visio.Drawing.5">
+                <p:oleObj spid="_x0000_s8216" name="VISIO" r:id="rId4" imgW="4126680" imgH="2227320" progId="Visio.Drawing.5">
                   <p:embed/>
                 </p:oleObj>
               </mc:Choice>
@@ -9867,7 +9873,7 @@
           <a:graphicData uri="http://schemas.openxmlformats.org/presentationml/2006/ole">
             <mc:AlternateContent xmlns:mc="http://schemas.openxmlformats.org/markup-compatibility/2006">
               <mc:Choice xmlns:v="urn:schemas-microsoft-com:vml" Requires="v">
-                <p:oleObj spid="_x0000_s9235" name="VISIO" r:id="rId4" imgW="4126680" imgH="2227320" progId="Visio.Drawing.5">
+                <p:oleObj spid="_x0000_s9240" name="VISIO" r:id="rId4" imgW="4126680" imgH="2227320" progId="Visio.Drawing.5">
                   <p:embed/>
                 </p:oleObj>
               </mc:Choice>
@@ -10182,7 +10188,7 @@
           <a:graphicData uri="http://schemas.openxmlformats.org/presentationml/2006/ole">
             <mc:AlternateContent xmlns:mc="http://schemas.openxmlformats.org/markup-compatibility/2006">
               <mc:Choice xmlns:v="urn:schemas-microsoft-com:vml" Requires="v">
-                <p:oleObj spid="_x0000_s10259" name="VISIO" r:id="rId4" imgW="4126680" imgH="2227320" progId="Visio.Drawing.5">
+                <p:oleObj spid="_x0000_s10264" name="VISIO" r:id="rId4" imgW="4126680" imgH="2227320" progId="Visio.Drawing.5">
                   <p:embed/>
                 </p:oleObj>
               </mc:Choice>
@@ -10513,7 +10519,7 @@
           <a:graphicData uri="http://schemas.openxmlformats.org/presentationml/2006/ole">
             <mc:AlternateContent xmlns:mc="http://schemas.openxmlformats.org/markup-compatibility/2006">
               <mc:Choice xmlns:v="urn:schemas-microsoft-com:vml" Requires="v">
-                <p:oleObj spid="_x0000_s11283" name="VISIO" r:id="rId4" imgW="4126680" imgH="2227320" progId="Visio.Drawing.5">
+                <p:oleObj spid="_x0000_s11288" name="VISIO" r:id="rId4" imgW="4126680" imgH="2227320" progId="Visio.Drawing.5">
                   <p:embed/>
                 </p:oleObj>
               </mc:Choice>
@@ -12558,980 +12564,1022 @@
       </p:sp>
       <p:grpSp>
         <p:nvGrpSpPr>
-          <p:cNvPr id="18" name="Group 17" descr="Small circle with number 1 inside  indicating step 1"/>
+          <p:cNvPr id="6" name="Group 5">
+            <a:extLst>
+              <a:ext uri="{FF2B5EF4-FFF2-40B4-BE49-F238E27FC236}">
+                <a16:creationId xmlns:a16="http://schemas.microsoft.com/office/drawing/2014/main" id="{1C23DE92-1EAD-4786-B648-3E9A2AF3FC19}"/>
+              </a:ext>
+            </a:extLst>
+          </p:cNvPr>
           <p:cNvGrpSpPr/>
           <p:nvPr/>
         </p:nvGrpSpPr>
-        <p:grpSpPr bwMode="blackWhite">
+        <p:grpSpPr>
           <a:xfrm>
-            <a:off x="2776095" y="1488223"/>
-            <a:ext cx="558179" cy="409838"/>
-            <a:chOff x="6950898" y="711274"/>
-            <a:chExt cx="558179" cy="409838"/>
+            <a:off x="995468" y="1488223"/>
+            <a:ext cx="10361916" cy="5019269"/>
+            <a:chOff x="995468" y="1488223"/>
+            <a:chExt cx="10361916" cy="5019269"/>
           </a:xfrm>
         </p:grpSpPr>
-        <p:sp>
-          <p:nvSpPr>
-            <p:cNvPr id="19" name="Oval 18" descr="Small circle"/>
-            <p:cNvSpPr/>
+        <p:grpSp>
+          <p:nvGrpSpPr>
+            <p:cNvPr id="18" name="Group 17" descr="Small circle with number 1 inside  indicating step 1"/>
+            <p:cNvGrpSpPr/>
             <p:nvPr/>
-          </p:nvSpPr>
-          <p:spPr bwMode="blackWhite">
+          </p:nvGrpSpPr>
+          <p:grpSpPr bwMode="blackWhite">
             <a:xfrm>
-              <a:off x="7025069" y="711274"/>
-              <a:ext cx="409838" cy="409838"/>
+              <a:off x="2776095" y="1488223"/>
+              <a:ext cx="558179" cy="409838"/>
+              <a:chOff x="6950898" y="711274"/>
+              <a:chExt cx="558179" cy="409838"/>
             </a:xfrm>
-            <a:prstGeom prst="ellipse">
-              <a:avLst/>
-            </a:prstGeom>
-            <a:solidFill>
-              <a:srgbClr val="D24726"/>
-            </a:solidFill>
-            <a:ln>
+          </p:grpSpPr>
+          <p:sp>
+            <p:nvSpPr>
+              <p:cNvPr id="19" name="Oval 18" descr="Small circle"/>
+              <p:cNvSpPr/>
+              <p:nvPr/>
+            </p:nvSpPr>
+            <p:spPr bwMode="blackWhite">
+              <a:xfrm>
+                <a:off x="7025069" y="711274"/>
+                <a:ext cx="409838" cy="409838"/>
+              </a:xfrm>
+              <a:prstGeom prst="ellipse">
+                <a:avLst/>
+              </a:prstGeom>
+              <a:solidFill>
+                <a:srgbClr val="D24726"/>
+              </a:solidFill>
+              <a:ln>
+                <a:noFill/>
+              </a:ln>
+            </p:spPr>
+            <p:style>
+              <a:lnRef idx="2">
+                <a:schemeClr val="accent1">
+                  <a:shade val="50000"/>
+                </a:schemeClr>
+              </a:lnRef>
+              <a:fillRef idx="1">
+                <a:schemeClr val="accent1"/>
+              </a:fillRef>
+              <a:effectRef idx="0">
+                <a:schemeClr val="accent1"/>
+              </a:effectRef>
+              <a:fontRef idx="minor">
+                <a:schemeClr val="lt1"/>
+              </a:fontRef>
+            </p:style>
+            <p:txBody>
+              <a:bodyPr rtlCol="0" anchor="ctr"/>
+              <a:lstStyle/>
+              <a:p>
+                <a:pPr algn="ctr"/>
+                <a:endParaRPr lang="en-US" dirty="0"/>
+              </a:p>
+            </p:txBody>
+          </p:sp>
+          <p:sp>
+            <p:nvSpPr>
+              <p:cNvPr id="20" name="TextBox 19" descr="Number 1"/>
+              <p:cNvSpPr txBox="1">
+                <a:spLocks noChangeAspect="1"/>
+              </p:cNvSpPr>
+              <p:nvPr/>
+            </p:nvSpPr>
+            <p:spPr bwMode="blackWhite">
+              <a:xfrm>
+                <a:off x="6950898" y="729983"/>
+                <a:ext cx="558179" cy="369332"/>
+              </a:xfrm>
+              <a:prstGeom prst="rect">
+                <a:avLst/>
+              </a:prstGeom>
               <a:noFill/>
-            </a:ln>
-          </p:spPr>
-          <p:style>
-            <a:lnRef idx="2">
-              <a:schemeClr val="accent1">
-                <a:shade val="50000"/>
-              </a:schemeClr>
-            </a:lnRef>
-            <a:fillRef idx="1">
-              <a:schemeClr val="accent1"/>
-            </a:fillRef>
-            <a:effectRef idx="0">
-              <a:schemeClr val="accent1"/>
-            </a:effectRef>
-            <a:fontRef idx="minor">
-              <a:schemeClr val="lt1"/>
-            </a:fontRef>
-          </p:style>
-          <p:txBody>
-            <a:bodyPr rtlCol="0" anchor="ctr"/>
-            <a:lstStyle/>
-            <a:p>
-              <a:pPr algn="ctr"/>
-              <a:endParaRPr lang="en-US" dirty="0"/>
-            </a:p>
-          </p:txBody>
-        </p:sp>
-        <p:sp>
-          <p:nvSpPr>
-            <p:cNvPr id="20" name="TextBox 19" descr="Number 1"/>
-            <p:cNvSpPr txBox="1">
-              <a:spLocks noChangeAspect="1"/>
-            </p:cNvSpPr>
+            </p:spPr>
+            <p:txBody>
+              <a:bodyPr wrap="square" rtlCol="0">
+                <a:spAutoFit/>
+              </a:bodyPr>
+              <a:lstStyle/>
+              <a:p>
+                <a:pPr algn="ctr"/>
+                <a:r>
+                  <a:rPr lang="en-US" dirty="0">
+                    <a:solidFill>
+                      <a:schemeClr val="bg1"/>
+                    </a:solidFill>
+                    <a:latin typeface="Segoe UI Semibold" panose="020B0702040204020203" pitchFamily="34" charset="0"/>
+                    <a:cs typeface="Segoe UI Semibold" panose="020B0702040204020203" pitchFamily="34" charset="0"/>
+                  </a:rPr>
+                  <a:t>1</a:t>
+                </a:r>
+              </a:p>
+            </p:txBody>
+          </p:sp>
+        </p:grpSp>
+        <p:grpSp>
+          <p:nvGrpSpPr>
+            <p:cNvPr id="33" name="Group 32" descr="Small circle with number 2 inside  indicating step 2"/>
+            <p:cNvGrpSpPr/>
             <p:nvPr/>
-          </p:nvSpPr>
-          <p:spPr bwMode="blackWhite">
+          </p:nvGrpSpPr>
+          <p:grpSpPr bwMode="blackWhite">
             <a:xfrm>
-              <a:off x="6950898" y="729983"/>
-              <a:ext cx="558179" cy="369332"/>
+              <a:off x="8695838" y="1494550"/>
+              <a:ext cx="558179" cy="409838"/>
+              <a:chOff x="6953426" y="711274"/>
+              <a:chExt cx="558179" cy="409838"/>
             </a:xfrm>
-            <a:prstGeom prst="rect">
-              <a:avLst/>
-            </a:prstGeom>
-            <a:noFill/>
-          </p:spPr>
-          <p:txBody>
-            <a:bodyPr wrap="square" rtlCol="0">
-              <a:spAutoFit/>
-            </a:bodyPr>
-            <a:lstStyle/>
-            <a:p>
-              <a:pPr algn="ctr"/>
-              <a:r>
-                <a:rPr lang="en-US" dirty="0">
+          </p:grpSpPr>
+          <p:sp>
+            <p:nvSpPr>
+              <p:cNvPr id="34" name="Oval 33" descr="Small circle"/>
+              <p:cNvSpPr/>
+              <p:nvPr/>
+            </p:nvSpPr>
+            <p:spPr bwMode="blackWhite">
+              <a:xfrm>
+                <a:off x="7025069" y="711274"/>
+                <a:ext cx="409838" cy="409838"/>
+              </a:xfrm>
+              <a:prstGeom prst="ellipse">
+                <a:avLst/>
+              </a:prstGeom>
+              <a:solidFill>
+                <a:srgbClr val="D24726"/>
+              </a:solidFill>
+              <a:ln>
+                <a:noFill/>
+              </a:ln>
+            </p:spPr>
+            <p:style>
+              <a:lnRef idx="2">
+                <a:schemeClr val="accent1">
+                  <a:shade val="50000"/>
+                </a:schemeClr>
+              </a:lnRef>
+              <a:fillRef idx="1">
+                <a:schemeClr val="accent1"/>
+              </a:fillRef>
+              <a:effectRef idx="0">
+                <a:schemeClr val="accent1"/>
+              </a:effectRef>
+              <a:fontRef idx="minor">
+                <a:schemeClr val="lt1"/>
+              </a:fontRef>
+            </p:style>
+            <p:txBody>
+              <a:bodyPr rtlCol="0" anchor="ctr"/>
+              <a:lstStyle/>
+              <a:p>
+                <a:pPr algn="ctr"/>
+                <a:endParaRPr lang="en-US" dirty="0"/>
+              </a:p>
+            </p:txBody>
+          </p:sp>
+          <p:sp>
+            <p:nvSpPr>
+              <p:cNvPr id="35" name="TextBox 34" descr="Number 2"/>
+              <p:cNvSpPr txBox="1">
+                <a:spLocks noChangeAspect="1"/>
+              </p:cNvSpPr>
+              <p:nvPr/>
+            </p:nvSpPr>
+            <p:spPr bwMode="blackWhite">
+              <a:xfrm>
+                <a:off x="6953426" y="727564"/>
+                <a:ext cx="558179" cy="369332"/>
+              </a:xfrm>
+              <a:prstGeom prst="rect">
+                <a:avLst/>
+              </a:prstGeom>
+              <a:noFill/>
+            </p:spPr>
+            <p:txBody>
+              <a:bodyPr wrap="square" rtlCol="0">
+                <a:spAutoFit/>
+              </a:bodyPr>
+              <a:lstStyle/>
+              <a:p>
+                <a:pPr algn="ctr"/>
+                <a:r>
+                  <a:rPr lang="en-US" dirty="0">
+                    <a:solidFill>
+                      <a:schemeClr val="bg1"/>
+                    </a:solidFill>
+                    <a:latin typeface="Segoe UI Semibold" panose="020B0702040204020203" pitchFamily="34" charset="0"/>
+                    <a:cs typeface="Segoe UI Semibold" panose="020B0702040204020203" pitchFamily="34" charset="0"/>
+                  </a:rPr>
+                  <a:t>2</a:t>
+                </a:r>
+              </a:p>
+            </p:txBody>
+          </p:sp>
+        </p:grpSp>
+        <p:grpSp>
+          <p:nvGrpSpPr>
+            <p:cNvPr id="5" name="Group 4">
+              <a:extLst>
+                <a:ext uri="{FF2B5EF4-FFF2-40B4-BE49-F238E27FC236}">
+                  <a16:creationId xmlns:a16="http://schemas.microsoft.com/office/drawing/2014/main" id="{3ADFDED6-D48C-4296-9745-670D692AED2A}"/>
+                </a:ext>
+              </a:extLst>
+            </p:cNvPr>
+            <p:cNvGrpSpPr/>
+            <p:nvPr/>
+          </p:nvGrpSpPr>
+          <p:grpSpPr>
+            <a:xfrm>
+              <a:off x="995468" y="2075227"/>
+              <a:ext cx="10361916" cy="4432265"/>
+              <a:chOff x="995468" y="2075227"/>
+              <a:chExt cx="10361916" cy="4432265"/>
+            </a:xfrm>
+          </p:grpSpPr>
+          <p:sp>
+            <p:nvSpPr>
+              <p:cNvPr id="32" name="Content Placeholder 17"/>
+              <p:cNvSpPr txBox="1">
+                <a:spLocks/>
+              </p:cNvSpPr>
+              <p:nvPr/>
+            </p:nvSpPr>
+            <p:spPr>
+              <a:xfrm>
+                <a:off x="1007978" y="2135243"/>
+                <a:ext cx="4504252" cy="471149"/>
+              </a:xfrm>
+              <a:prstGeom prst="rect">
+                <a:avLst/>
+              </a:prstGeom>
+            </p:spPr>
+            <p:txBody>
+              <a:bodyPr vert="horz" lIns="91440" tIns="45720" rIns="91440" bIns="45720" rtlCol="0">
+                <a:normAutofit/>
+              </a:bodyPr>
+              <a:lstStyle>
+                <a:lvl1pPr marL="228600" indent="-228600" algn="l" defTabSz="914400" rtl="0" eaLnBrk="1" latinLnBrk="0" hangingPunct="1">
+                  <a:lnSpc>
+                    <a:spcPts val="1800"/>
+                  </a:lnSpc>
+                  <a:spcBef>
+                    <a:spcPts val="1000"/>
+                  </a:spcBef>
+                  <a:spcAft>
+                    <a:spcPts val="1000"/>
+                  </a:spcAft>
+                  <a:buFont typeface="Arial" panose="020B0604020202020204" pitchFamily="34" charset="0"/>
+                  <a:buChar char="•"/>
+                  <a:defRPr lang="en-US" sz="1200" kern="1200" smtClean="0">
+                    <a:solidFill>
+                      <a:schemeClr val="tx1">
+                        <a:lumMod val="75000"/>
+                        <a:lumOff val="25000"/>
+                      </a:schemeClr>
+                    </a:solidFill>
+                    <a:latin typeface="+mn-lt"/>
+                    <a:ea typeface="+mn-ea"/>
+                    <a:cs typeface="+mn-cs"/>
+                  </a:defRPr>
+                </a:lvl1pPr>
+                <a:lvl2pPr marL="685800" indent="-228600" algn="l" defTabSz="914400" rtl="0" eaLnBrk="1" latinLnBrk="0" hangingPunct="1">
+                  <a:lnSpc>
+                    <a:spcPts val="1800"/>
+                  </a:lnSpc>
+                  <a:spcBef>
+                    <a:spcPts val="1000"/>
+                  </a:spcBef>
+                  <a:spcAft>
+                    <a:spcPts val="1000"/>
+                  </a:spcAft>
+                  <a:buFont typeface="Arial" panose="020B0604020202020204" pitchFamily="34" charset="0"/>
+                  <a:buChar char="•"/>
+                  <a:defRPr lang="en-US" sz="1200" kern="1200" smtClean="0">
+                    <a:solidFill>
+                      <a:schemeClr val="tx1">
+                        <a:lumMod val="75000"/>
+                        <a:lumOff val="25000"/>
+                      </a:schemeClr>
+                    </a:solidFill>
+                    <a:latin typeface="+mn-lt"/>
+                    <a:ea typeface="+mn-ea"/>
+                    <a:cs typeface="+mn-cs"/>
+                  </a:defRPr>
+                </a:lvl2pPr>
+                <a:lvl3pPr marL="1143000" indent="-228600" algn="l" defTabSz="914400" rtl="0" eaLnBrk="1" latinLnBrk="0" hangingPunct="1">
+                  <a:lnSpc>
+                    <a:spcPts val="1800"/>
+                  </a:lnSpc>
+                  <a:spcBef>
+                    <a:spcPts val="1000"/>
+                  </a:spcBef>
+                  <a:spcAft>
+                    <a:spcPts val="1000"/>
+                  </a:spcAft>
+                  <a:buFont typeface="Arial" panose="020B0604020202020204" pitchFamily="34" charset="0"/>
+                  <a:buChar char="•"/>
+                  <a:defRPr lang="en-US" sz="1200" kern="1200" smtClean="0">
+                    <a:solidFill>
+                      <a:schemeClr val="tx1">
+                        <a:lumMod val="75000"/>
+                        <a:lumOff val="25000"/>
+                      </a:schemeClr>
+                    </a:solidFill>
+                    <a:latin typeface="+mn-lt"/>
+                    <a:ea typeface="+mn-ea"/>
+                    <a:cs typeface="+mn-cs"/>
+                  </a:defRPr>
+                </a:lvl3pPr>
+                <a:lvl4pPr marL="1600200" indent="-228600" algn="l" defTabSz="914400" rtl="0" eaLnBrk="1" latinLnBrk="0" hangingPunct="1">
+                  <a:lnSpc>
+                    <a:spcPts val="1800"/>
+                  </a:lnSpc>
+                  <a:spcBef>
+                    <a:spcPts val="1000"/>
+                  </a:spcBef>
+                  <a:spcAft>
+                    <a:spcPts val="1000"/>
+                  </a:spcAft>
+                  <a:buFont typeface="Arial" panose="020B0604020202020204" pitchFamily="34" charset="0"/>
+                  <a:buChar char="•"/>
+                  <a:defRPr lang="en-US" sz="1200" kern="1200" smtClean="0">
+                    <a:solidFill>
+                      <a:schemeClr val="tx1">
+                        <a:lumMod val="75000"/>
+                        <a:lumOff val="25000"/>
+                      </a:schemeClr>
+                    </a:solidFill>
+                    <a:latin typeface="+mn-lt"/>
+                    <a:ea typeface="+mn-ea"/>
+                    <a:cs typeface="+mn-cs"/>
+                  </a:defRPr>
+                </a:lvl4pPr>
+                <a:lvl5pPr marL="2057400" indent="-228600" algn="l" defTabSz="914400" rtl="0" eaLnBrk="1" latinLnBrk="0" hangingPunct="1">
+                  <a:lnSpc>
+                    <a:spcPts val="1800"/>
+                  </a:lnSpc>
+                  <a:spcBef>
+                    <a:spcPts val="1000"/>
+                  </a:spcBef>
+                  <a:spcAft>
+                    <a:spcPts val="1000"/>
+                  </a:spcAft>
+                  <a:buFont typeface="Arial" panose="020B0604020202020204" pitchFamily="34" charset="0"/>
+                  <a:buChar char="•"/>
+                  <a:defRPr lang="en-US" sz="1200" kern="1200">
+                    <a:solidFill>
+                      <a:schemeClr val="tx1">
+                        <a:lumMod val="75000"/>
+                        <a:lumOff val="25000"/>
+                      </a:schemeClr>
+                    </a:solidFill>
+                    <a:latin typeface="+mn-lt"/>
+                    <a:ea typeface="+mn-ea"/>
+                    <a:cs typeface="+mn-cs"/>
+                  </a:defRPr>
+                </a:lvl5pPr>
+                <a:lvl6pPr marL="2514600" indent="-228600" algn="l" defTabSz="914400" rtl="0" eaLnBrk="1" latinLnBrk="0" hangingPunct="1">
+                  <a:lnSpc>
+                    <a:spcPct val="90000"/>
+                  </a:lnSpc>
+                  <a:spcBef>
+                    <a:spcPct val="30000"/>
+                  </a:spcBef>
+                  <a:buFont typeface="Arial" panose="020B0604020202020204" pitchFamily="34" charset="0"/>
+                  <a:buChar char="•"/>
+                  <a:defRPr sz="1800" kern="1200">
+                    <a:solidFill>
+                      <a:schemeClr val="tx1"/>
+                    </a:solidFill>
+                    <a:latin typeface="+mn-lt"/>
+                    <a:ea typeface="+mn-ea"/>
+                    <a:cs typeface="+mn-cs"/>
+                  </a:defRPr>
+                </a:lvl6pPr>
+                <a:lvl7pPr marL="2971800" indent="-228600" algn="l" defTabSz="914400" rtl="0" eaLnBrk="1" latinLnBrk="0" hangingPunct="1">
+                  <a:lnSpc>
+                    <a:spcPct val="90000"/>
+                  </a:lnSpc>
+                  <a:spcBef>
+                    <a:spcPct val="30000"/>
+                  </a:spcBef>
+                  <a:buFont typeface="Arial" panose="020B0604020202020204" pitchFamily="34" charset="0"/>
+                  <a:buChar char="•"/>
+                  <a:defRPr sz="1800" kern="1200">
+                    <a:solidFill>
+                      <a:schemeClr val="tx1"/>
+                    </a:solidFill>
+                    <a:latin typeface="+mn-lt"/>
+                    <a:ea typeface="+mn-ea"/>
+                    <a:cs typeface="+mn-cs"/>
+                  </a:defRPr>
+                </a:lvl7pPr>
+                <a:lvl8pPr marL="3429000" indent="-228600" algn="l" defTabSz="914400" rtl="0" eaLnBrk="1" latinLnBrk="0" hangingPunct="1">
+                  <a:lnSpc>
+                    <a:spcPct val="90000"/>
+                  </a:lnSpc>
+                  <a:spcBef>
+                    <a:spcPct val="30000"/>
+                  </a:spcBef>
+                  <a:buFont typeface="Arial" panose="020B0604020202020204" pitchFamily="34" charset="0"/>
+                  <a:buChar char="•"/>
+                  <a:defRPr sz="1800" kern="1200">
+                    <a:solidFill>
+                      <a:schemeClr val="tx1"/>
+                    </a:solidFill>
+                    <a:latin typeface="+mn-lt"/>
+                    <a:ea typeface="+mn-ea"/>
+                    <a:cs typeface="+mn-cs"/>
+                  </a:defRPr>
+                </a:lvl8pPr>
+                <a:lvl9pPr marL="3886200" indent="-228600" algn="l" defTabSz="914400" rtl="0" eaLnBrk="1" latinLnBrk="0" hangingPunct="1">
+                  <a:lnSpc>
+                    <a:spcPct val="90000"/>
+                  </a:lnSpc>
+                  <a:spcBef>
+                    <a:spcPct val="30000"/>
+                  </a:spcBef>
+                  <a:buFont typeface="Arial" panose="020B0604020202020204" pitchFamily="34" charset="0"/>
+                  <a:buChar char="•"/>
+                  <a:defRPr sz="1800" kern="1200">
+                    <a:solidFill>
+                      <a:schemeClr val="tx1"/>
+                    </a:solidFill>
+                    <a:latin typeface="+mn-lt"/>
+                    <a:ea typeface="+mn-ea"/>
+                    <a:cs typeface="+mn-cs"/>
+                  </a:defRPr>
+                </a:lvl9pPr>
+              </a:lstStyle>
+              <a:p>
+                <a:pPr marL="0" lvl="0" indent="0">
+                  <a:spcAft>
+                    <a:spcPts val="600"/>
+                  </a:spcAft>
+                  <a:buNone/>
+                  <a:defRPr/>
+                </a:pPr>
+                <a:r>
+                  <a:rPr lang="en-US" sz="2800" b="1" dirty="0"/>
+                  <a:t>Functional Testing types</a:t>
+                </a:r>
+                <a:endParaRPr lang="en-US" sz="2800" dirty="0">
                   <a:solidFill>
-                    <a:schemeClr val="bg1"/>
+                    <a:prstClr val="black">
+                      <a:lumMod val="75000"/>
+                      <a:lumOff val="25000"/>
+                    </a:prstClr>
                   </a:solidFill>
-                  <a:latin typeface="Segoe UI Semibold" panose="020B0702040204020203" pitchFamily="34" charset="0"/>
-                  <a:cs typeface="Segoe UI Semibold" panose="020B0702040204020203" pitchFamily="34" charset="0"/>
-                </a:rPr>
-                <a:t>1</a:t>
-              </a:r>
-            </a:p>
-          </p:txBody>
-        </p:sp>
+                  <a:cs typeface="Segoe UI"/>
+                </a:endParaRPr>
+              </a:p>
+            </p:txBody>
+          </p:sp>
+          <p:sp>
+            <p:nvSpPr>
+              <p:cNvPr id="26" name="Content Placeholder 17">
+                <a:extLst>
+                  <a:ext uri="{FF2B5EF4-FFF2-40B4-BE49-F238E27FC236}">
+                    <a16:creationId xmlns:a16="http://schemas.microsoft.com/office/drawing/2014/main" id="{F3972F21-1995-4BBE-8F7E-2E62D49448EF}"/>
+                  </a:ext>
+                </a:extLst>
+              </p:cNvPr>
+              <p:cNvSpPr txBox="1">
+                <a:spLocks/>
+              </p:cNvSpPr>
+              <p:nvPr/>
+            </p:nvSpPr>
+            <p:spPr>
+              <a:xfrm>
+                <a:off x="6720274" y="2075227"/>
+                <a:ext cx="4504252" cy="471149"/>
+              </a:xfrm>
+              <a:prstGeom prst="rect">
+                <a:avLst/>
+              </a:prstGeom>
+            </p:spPr>
+            <p:txBody>
+              <a:bodyPr vert="horz" lIns="91440" tIns="45720" rIns="91440" bIns="45720" rtlCol="0">
+                <a:normAutofit fontScale="85000" lnSpcReduction="10000"/>
+              </a:bodyPr>
+              <a:lstStyle>
+                <a:lvl1pPr marL="228600" indent="-228600" algn="l" defTabSz="914400" rtl="0" eaLnBrk="1" latinLnBrk="0" hangingPunct="1">
+                  <a:lnSpc>
+                    <a:spcPts val="1800"/>
+                  </a:lnSpc>
+                  <a:spcBef>
+                    <a:spcPts val="1000"/>
+                  </a:spcBef>
+                  <a:spcAft>
+                    <a:spcPts val="1000"/>
+                  </a:spcAft>
+                  <a:buFont typeface="Arial" panose="020B0604020202020204" pitchFamily="34" charset="0"/>
+                  <a:buChar char="•"/>
+                  <a:defRPr lang="en-US" sz="1200" kern="1200" smtClean="0">
+                    <a:solidFill>
+                      <a:schemeClr val="tx1">
+                        <a:lumMod val="75000"/>
+                        <a:lumOff val="25000"/>
+                      </a:schemeClr>
+                    </a:solidFill>
+                    <a:latin typeface="+mn-lt"/>
+                    <a:ea typeface="+mn-ea"/>
+                    <a:cs typeface="+mn-cs"/>
+                  </a:defRPr>
+                </a:lvl1pPr>
+                <a:lvl2pPr marL="685800" indent="-228600" algn="l" defTabSz="914400" rtl="0" eaLnBrk="1" latinLnBrk="0" hangingPunct="1">
+                  <a:lnSpc>
+                    <a:spcPts val="1800"/>
+                  </a:lnSpc>
+                  <a:spcBef>
+                    <a:spcPts val="1000"/>
+                  </a:spcBef>
+                  <a:spcAft>
+                    <a:spcPts val="1000"/>
+                  </a:spcAft>
+                  <a:buFont typeface="Arial" panose="020B0604020202020204" pitchFamily="34" charset="0"/>
+                  <a:buChar char="•"/>
+                  <a:defRPr lang="en-US" sz="1200" kern="1200" smtClean="0">
+                    <a:solidFill>
+                      <a:schemeClr val="tx1">
+                        <a:lumMod val="75000"/>
+                        <a:lumOff val="25000"/>
+                      </a:schemeClr>
+                    </a:solidFill>
+                    <a:latin typeface="+mn-lt"/>
+                    <a:ea typeface="+mn-ea"/>
+                    <a:cs typeface="+mn-cs"/>
+                  </a:defRPr>
+                </a:lvl2pPr>
+                <a:lvl3pPr marL="1143000" indent="-228600" algn="l" defTabSz="914400" rtl="0" eaLnBrk="1" latinLnBrk="0" hangingPunct="1">
+                  <a:lnSpc>
+                    <a:spcPts val="1800"/>
+                  </a:lnSpc>
+                  <a:spcBef>
+                    <a:spcPts val="1000"/>
+                  </a:spcBef>
+                  <a:spcAft>
+                    <a:spcPts val="1000"/>
+                  </a:spcAft>
+                  <a:buFont typeface="Arial" panose="020B0604020202020204" pitchFamily="34" charset="0"/>
+                  <a:buChar char="•"/>
+                  <a:defRPr lang="en-US" sz="1200" kern="1200" smtClean="0">
+                    <a:solidFill>
+                      <a:schemeClr val="tx1">
+                        <a:lumMod val="75000"/>
+                        <a:lumOff val="25000"/>
+                      </a:schemeClr>
+                    </a:solidFill>
+                    <a:latin typeface="+mn-lt"/>
+                    <a:ea typeface="+mn-ea"/>
+                    <a:cs typeface="+mn-cs"/>
+                  </a:defRPr>
+                </a:lvl3pPr>
+                <a:lvl4pPr marL="1600200" indent="-228600" algn="l" defTabSz="914400" rtl="0" eaLnBrk="1" latinLnBrk="0" hangingPunct="1">
+                  <a:lnSpc>
+                    <a:spcPts val="1800"/>
+                  </a:lnSpc>
+                  <a:spcBef>
+                    <a:spcPts val="1000"/>
+                  </a:spcBef>
+                  <a:spcAft>
+                    <a:spcPts val="1000"/>
+                  </a:spcAft>
+                  <a:buFont typeface="Arial" panose="020B0604020202020204" pitchFamily="34" charset="0"/>
+                  <a:buChar char="•"/>
+                  <a:defRPr lang="en-US" sz="1200" kern="1200" smtClean="0">
+                    <a:solidFill>
+                      <a:schemeClr val="tx1">
+                        <a:lumMod val="75000"/>
+                        <a:lumOff val="25000"/>
+                      </a:schemeClr>
+                    </a:solidFill>
+                    <a:latin typeface="+mn-lt"/>
+                    <a:ea typeface="+mn-ea"/>
+                    <a:cs typeface="+mn-cs"/>
+                  </a:defRPr>
+                </a:lvl4pPr>
+                <a:lvl5pPr marL="2057400" indent="-228600" algn="l" defTabSz="914400" rtl="0" eaLnBrk="1" latinLnBrk="0" hangingPunct="1">
+                  <a:lnSpc>
+                    <a:spcPts val="1800"/>
+                  </a:lnSpc>
+                  <a:spcBef>
+                    <a:spcPts val="1000"/>
+                  </a:spcBef>
+                  <a:spcAft>
+                    <a:spcPts val="1000"/>
+                  </a:spcAft>
+                  <a:buFont typeface="Arial" panose="020B0604020202020204" pitchFamily="34" charset="0"/>
+                  <a:buChar char="•"/>
+                  <a:defRPr lang="en-US" sz="1200" kern="1200">
+                    <a:solidFill>
+                      <a:schemeClr val="tx1">
+                        <a:lumMod val="75000"/>
+                        <a:lumOff val="25000"/>
+                      </a:schemeClr>
+                    </a:solidFill>
+                    <a:latin typeface="+mn-lt"/>
+                    <a:ea typeface="+mn-ea"/>
+                    <a:cs typeface="+mn-cs"/>
+                  </a:defRPr>
+                </a:lvl5pPr>
+                <a:lvl6pPr marL="2514600" indent="-228600" algn="l" defTabSz="914400" rtl="0" eaLnBrk="1" latinLnBrk="0" hangingPunct="1">
+                  <a:lnSpc>
+                    <a:spcPct val="90000"/>
+                  </a:lnSpc>
+                  <a:spcBef>
+                    <a:spcPct val="30000"/>
+                  </a:spcBef>
+                  <a:buFont typeface="Arial" panose="020B0604020202020204" pitchFamily="34" charset="0"/>
+                  <a:buChar char="•"/>
+                  <a:defRPr sz="1800" kern="1200">
+                    <a:solidFill>
+                      <a:schemeClr val="tx1"/>
+                    </a:solidFill>
+                    <a:latin typeface="+mn-lt"/>
+                    <a:ea typeface="+mn-ea"/>
+                    <a:cs typeface="+mn-cs"/>
+                  </a:defRPr>
+                </a:lvl6pPr>
+                <a:lvl7pPr marL="2971800" indent="-228600" algn="l" defTabSz="914400" rtl="0" eaLnBrk="1" latinLnBrk="0" hangingPunct="1">
+                  <a:lnSpc>
+                    <a:spcPct val="90000"/>
+                  </a:lnSpc>
+                  <a:spcBef>
+                    <a:spcPct val="30000"/>
+                  </a:spcBef>
+                  <a:buFont typeface="Arial" panose="020B0604020202020204" pitchFamily="34" charset="0"/>
+                  <a:buChar char="•"/>
+                  <a:defRPr sz="1800" kern="1200">
+                    <a:solidFill>
+                      <a:schemeClr val="tx1"/>
+                    </a:solidFill>
+                    <a:latin typeface="+mn-lt"/>
+                    <a:ea typeface="+mn-ea"/>
+                    <a:cs typeface="+mn-cs"/>
+                  </a:defRPr>
+                </a:lvl7pPr>
+                <a:lvl8pPr marL="3429000" indent="-228600" algn="l" defTabSz="914400" rtl="0" eaLnBrk="1" latinLnBrk="0" hangingPunct="1">
+                  <a:lnSpc>
+                    <a:spcPct val="90000"/>
+                  </a:lnSpc>
+                  <a:spcBef>
+                    <a:spcPct val="30000"/>
+                  </a:spcBef>
+                  <a:buFont typeface="Arial" panose="020B0604020202020204" pitchFamily="34" charset="0"/>
+                  <a:buChar char="•"/>
+                  <a:defRPr sz="1800" kern="1200">
+                    <a:solidFill>
+                      <a:schemeClr val="tx1"/>
+                    </a:solidFill>
+                    <a:latin typeface="+mn-lt"/>
+                    <a:ea typeface="+mn-ea"/>
+                    <a:cs typeface="+mn-cs"/>
+                  </a:defRPr>
+                </a:lvl8pPr>
+                <a:lvl9pPr marL="3886200" indent="-228600" algn="l" defTabSz="914400" rtl="0" eaLnBrk="1" latinLnBrk="0" hangingPunct="1">
+                  <a:lnSpc>
+                    <a:spcPct val="90000"/>
+                  </a:lnSpc>
+                  <a:spcBef>
+                    <a:spcPct val="30000"/>
+                  </a:spcBef>
+                  <a:buFont typeface="Arial" panose="020B0604020202020204" pitchFamily="34" charset="0"/>
+                  <a:buChar char="•"/>
+                  <a:defRPr sz="1800" kern="1200">
+                    <a:solidFill>
+                      <a:schemeClr val="tx1"/>
+                    </a:solidFill>
+                    <a:latin typeface="+mn-lt"/>
+                    <a:ea typeface="+mn-ea"/>
+                    <a:cs typeface="+mn-cs"/>
+                  </a:defRPr>
+                </a:lvl9pPr>
+              </a:lstStyle>
+              <a:p>
+                <a:pPr marL="0" lvl="0" indent="0">
+                  <a:spcAft>
+                    <a:spcPts val="600"/>
+                  </a:spcAft>
+                  <a:buNone/>
+                  <a:defRPr/>
+                </a:pPr>
+                <a:r>
+                  <a:rPr lang="en-US" sz="2800" b="1" dirty="0"/>
+                  <a:t>Non-functional Testing types</a:t>
+                </a:r>
+              </a:p>
+            </p:txBody>
+          </p:sp>
+          <p:sp>
+            <p:nvSpPr>
+              <p:cNvPr id="2" name="Rectangle 1">
+                <a:extLst>
+                  <a:ext uri="{FF2B5EF4-FFF2-40B4-BE49-F238E27FC236}">
+                    <a16:creationId xmlns:a16="http://schemas.microsoft.com/office/drawing/2014/main" id="{C0703CB6-DC64-4593-9087-5A3DDCB3049F}"/>
+                  </a:ext>
+                </a:extLst>
+              </p:cNvPr>
+              <p:cNvSpPr/>
+              <p:nvPr/>
+            </p:nvSpPr>
+            <p:spPr>
+              <a:xfrm>
+                <a:off x="995468" y="2475619"/>
+                <a:ext cx="4677612" cy="4031873"/>
+              </a:xfrm>
+              <a:prstGeom prst="rect">
+                <a:avLst/>
+              </a:prstGeom>
+            </p:spPr>
+            <p:txBody>
+              <a:bodyPr wrap="square">
+                <a:spAutoFit/>
+              </a:bodyPr>
+              <a:lstStyle/>
+              <a:p>
+                <a:pPr marL="285750" indent="-285750">
+                  <a:buFont typeface="Wingdings" panose="05000000000000000000" pitchFamily="2" charset="2"/>
+                  <a:buChar char="q"/>
+                </a:pPr>
+                <a:r>
+                  <a:rPr lang="en-US" sz="3200" dirty="0">
+                    <a:solidFill>
+                      <a:srgbClr val="3A3A3A"/>
+                    </a:solidFill>
+                    <a:latin typeface="Work Sans"/>
+                  </a:rPr>
+                  <a:t>Unit Testing</a:t>
+                </a:r>
+              </a:p>
+              <a:p>
+                <a:pPr marL="285750" indent="-285750">
+                  <a:buFont typeface="Wingdings" panose="05000000000000000000" pitchFamily="2" charset="2"/>
+                  <a:buChar char="q"/>
+                </a:pPr>
+                <a:r>
+                  <a:rPr lang="en-US" sz="3200" dirty="0">
+                    <a:solidFill>
+                      <a:srgbClr val="3A3A3A"/>
+                    </a:solidFill>
+                    <a:latin typeface="Work Sans"/>
+                  </a:rPr>
+                  <a:t>Integration Testing</a:t>
+                </a:r>
+              </a:p>
+              <a:p>
+                <a:pPr marL="285750" indent="-285750">
+                  <a:buFont typeface="Wingdings" panose="05000000000000000000" pitchFamily="2" charset="2"/>
+                  <a:buChar char="q"/>
+                </a:pPr>
+                <a:r>
+                  <a:rPr lang="en-US" sz="3200" dirty="0">
+                    <a:solidFill>
+                      <a:srgbClr val="3A3A3A"/>
+                    </a:solidFill>
+                    <a:latin typeface="Work Sans"/>
+                  </a:rPr>
+                  <a:t>System Testing</a:t>
+                </a:r>
+              </a:p>
+              <a:p>
+                <a:pPr marL="285750" indent="-285750">
+                  <a:buFont typeface="Wingdings" panose="05000000000000000000" pitchFamily="2" charset="2"/>
+                  <a:buChar char="q"/>
+                </a:pPr>
+                <a:r>
+                  <a:rPr lang="en-US" sz="3200" dirty="0">
+                    <a:solidFill>
+                      <a:srgbClr val="3A3A3A"/>
+                    </a:solidFill>
+                    <a:latin typeface="Work Sans"/>
+                  </a:rPr>
+                  <a:t>Sanity Testing</a:t>
+                </a:r>
+              </a:p>
+              <a:p>
+                <a:pPr marL="285750" indent="-285750">
+                  <a:buFont typeface="Wingdings" panose="05000000000000000000" pitchFamily="2" charset="2"/>
+                  <a:buChar char="q"/>
+                </a:pPr>
+                <a:r>
+                  <a:rPr lang="en-US" sz="3200" dirty="0">
+                    <a:solidFill>
+                      <a:srgbClr val="3A3A3A"/>
+                    </a:solidFill>
+                    <a:latin typeface="Work Sans"/>
+                  </a:rPr>
+                  <a:t>Smoke Testing</a:t>
+                </a:r>
+              </a:p>
+              <a:p>
+                <a:pPr marL="285750" indent="-285750">
+                  <a:buFont typeface="Wingdings" panose="05000000000000000000" pitchFamily="2" charset="2"/>
+                  <a:buChar char="q"/>
+                </a:pPr>
+                <a:r>
+                  <a:rPr lang="en-US" sz="3200" dirty="0">
+                    <a:solidFill>
+                      <a:srgbClr val="3A3A3A"/>
+                    </a:solidFill>
+                    <a:latin typeface="Work Sans"/>
+                  </a:rPr>
+                  <a:t>Interface Testing</a:t>
+                </a:r>
+              </a:p>
+              <a:p>
+                <a:pPr marL="285750" indent="-285750">
+                  <a:buFont typeface="Wingdings" panose="05000000000000000000" pitchFamily="2" charset="2"/>
+                  <a:buChar char="q"/>
+                </a:pPr>
+                <a:r>
+                  <a:rPr lang="en-US" sz="3200" dirty="0">
+                    <a:solidFill>
+                      <a:srgbClr val="3A3A3A"/>
+                    </a:solidFill>
+                    <a:latin typeface="Work Sans"/>
+                  </a:rPr>
+                  <a:t>Regression Testing</a:t>
+                </a:r>
+              </a:p>
+              <a:p>
+                <a:pPr marL="285750" indent="-285750">
+                  <a:buFont typeface="Wingdings" panose="05000000000000000000" pitchFamily="2" charset="2"/>
+                  <a:buChar char="q"/>
+                </a:pPr>
+                <a:r>
+                  <a:rPr lang="en-US" sz="3200" dirty="0">
+                    <a:solidFill>
+                      <a:srgbClr val="3A3A3A"/>
+                    </a:solidFill>
+                    <a:latin typeface="Work Sans"/>
+                  </a:rPr>
+                  <a:t>Beta/Acceptance Testing</a:t>
+                </a:r>
+                <a:endParaRPr lang="en-US" sz="3200" b="0" i="0" dirty="0">
+                  <a:solidFill>
+                    <a:srgbClr val="3A3A3A"/>
+                  </a:solidFill>
+                  <a:effectLst/>
+                  <a:latin typeface="Work Sans"/>
+                </a:endParaRPr>
+              </a:p>
+            </p:txBody>
+          </p:sp>
+          <p:sp>
+            <p:nvSpPr>
+              <p:cNvPr id="27" name="Rectangle 26">
+                <a:extLst>
+                  <a:ext uri="{FF2B5EF4-FFF2-40B4-BE49-F238E27FC236}">
+                    <a16:creationId xmlns:a16="http://schemas.microsoft.com/office/drawing/2014/main" id="{3F351963-6621-4385-8877-7B90A8AF42EE}"/>
+                  </a:ext>
+                </a:extLst>
+              </p:cNvPr>
+              <p:cNvSpPr/>
+              <p:nvPr/>
+            </p:nvSpPr>
+            <p:spPr>
+              <a:xfrm>
+                <a:off x="6679772" y="2327092"/>
+                <a:ext cx="4677612" cy="4031873"/>
+              </a:xfrm>
+              <a:prstGeom prst="rect">
+                <a:avLst/>
+              </a:prstGeom>
+            </p:spPr>
+            <p:txBody>
+              <a:bodyPr wrap="square">
+                <a:spAutoFit/>
+              </a:bodyPr>
+              <a:lstStyle/>
+              <a:p>
+                <a:pPr marL="285750" indent="-285750">
+                  <a:buFont typeface="Wingdings" panose="05000000000000000000" pitchFamily="2" charset="2"/>
+                  <a:buChar char="q"/>
+                </a:pPr>
+                <a:r>
+                  <a:rPr lang="en-US" sz="3200" dirty="0">
+                    <a:solidFill>
+                      <a:srgbClr val="3A3A3A"/>
+                    </a:solidFill>
+                    <a:latin typeface="Work Sans"/>
+                  </a:rPr>
+                  <a:t>Performance Testing</a:t>
+                </a:r>
+              </a:p>
+              <a:p>
+                <a:pPr marL="285750" indent="-285750">
+                  <a:buFont typeface="Wingdings" panose="05000000000000000000" pitchFamily="2" charset="2"/>
+                  <a:buChar char="q"/>
+                </a:pPr>
+                <a:r>
+                  <a:rPr lang="en-US" sz="3200" dirty="0">
+                    <a:solidFill>
+                      <a:srgbClr val="3A3A3A"/>
+                    </a:solidFill>
+                    <a:latin typeface="Work Sans"/>
+                  </a:rPr>
+                  <a:t>Load Testing</a:t>
+                </a:r>
+              </a:p>
+              <a:p>
+                <a:pPr marL="285750" indent="-285750">
+                  <a:buFont typeface="Wingdings" panose="05000000000000000000" pitchFamily="2" charset="2"/>
+                  <a:buChar char="q"/>
+                </a:pPr>
+                <a:r>
+                  <a:rPr lang="en-US" sz="3200" dirty="0">
+                    <a:solidFill>
+                      <a:srgbClr val="3A3A3A"/>
+                    </a:solidFill>
+                    <a:latin typeface="Work Sans"/>
+                  </a:rPr>
+                  <a:t>Stress Testing</a:t>
+                </a:r>
+              </a:p>
+              <a:p>
+                <a:pPr marL="285750" indent="-285750">
+                  <a:buFont typeface="Wingdings" panose="05000000000000000000" pitchFamily="2" charset="2"/>
+                  <a:buChar char="q"/>
+                </a:pPr>
+                <a:r>
+                  <a:rPr lang="en-US" sz="3200" dirty="0">
+                    <a:solidFill>
+                      <a:srgbClr val="3A3A3A"/>
+                    </a:solidFill>
+                    <a:latin typeface="Work Sans"/>
+                  </a:rPr>
+                  <a:t>Volume Testing</a:t>
+                </a:r>
+              </a:p>
+              <a:p>
+                <a:pPr marL="285750" indent="-285750">
+                  <a:buFont typeface="Wingdings" panose="05000000000000000000" pitchFamily="2" charset="2"/>
+                  <a:buChar char="q"/>
+                </a:pPr>
+                <a:r>
+                  <a:rPr lang="en-US" sz="3200" dirty="0">
+                    <a:solidFill>
+                      <a:srgbClr val="3A3A3A"/>
+                    </a:solidFill>
+                    <a:latin typeface="Work Sans"/>
+                  </a:rPr>
+                  <a:t>Security Testing</a:t>
+                </a:r>
+              </a:p>
+              <a:p>
+                <a:pPr marL="285750" indent="-285750">
+                  <a:buFont typeface="Wingdings" panose="05000000000000000000" pitchFamily="2" charset="2"/>
+                  <a:buChar char="q"/>
+                </a:pPr>
+                <a:r>
+                  <a:rPr lang="en-US" sz="3200" dirty="0">
+                    <a:solidFill>
+                      <a:srgbClr val="3A3A3A"/>
+                    </a:solidFill>
+                    <a:latin typeface="Work Sans"/>
+                  </a:rPr>
+                  <a:t>Compatibility Testing</a:t>
+                </a:r>
+              </a:p>
+              <a:p>
+                <a:pPr marL="285750" indent="-285750">
+                  <a:buFont typeface="Wingdings" panose="05000000000000000000" pitchFamily="2" charset="2"/>
+                  <a:buChar char="q"/>
+                </a:pPr>
+                <a:r>
+                  <a:rPr lang="en-US" sz="3200" dirty="0">
+                    <a:solidFill>
+                      <a:srgbClr val="3A3A3A"/>
+                    </a:solidFill>
+                    <a:latin typeface="Work Sans"/>
+                  </a:rPr>
+                  <a:t>Install Testing</a:t>
+                </a:r>
+              </a:p>
+              <a:p>
+                <a:pPr marL="285750" indent="-285750">
+                  <a:buFont typeface="Wingdings" panose="05000000000000000000" pitchFamily="2" charset="2"/>
+                  <a:buChar char="q"/>
+                </a:pPr>
+                <a:r>
+                  <a:rPr lang="en-US" sz="3200" dirty="0">
+                    <a:solidFill>
+                      <a:srgbClr val="3A3A3A"/>
+                    </a:solidFill>
+                    <a:latin typeface="Work Sans"/>
+                  </a:rPr>
+                  <a:t>etc.</a:t>
+                </a:r>
+              </a:p>
+            </p:txBody>
+          </p:sp>
+        </p:grpSp>
       </p:grpSp>
-      <p:grpSp>
-        <p:nvGrpSpPr>
-          <p:cNvPr id="33" name="Group 32" descr="Small circle with number 2 inside  indicating step 2"/>
-          <p:cNvGrpSpPr/>
-          <p:nvPr/>
-        </p:nvGrpSpPr>
-        <p:grpSpPr bwMode="blackWhite">
-          <a:xfrm>
-            <a:off x="8695838" y="1494550"/>
-            <a:ext cx="558179" cy="409838"/>
-            <a:chOff x="6953426" y="711274"/>
-            <a:chExt cx="558179" cy="409838"/>
-          </a:xfrm>
-        </p:grpSpPr>
-        <p:sp>
-          <p:nvSpPr>
-            <p:cNvPr id="34" name="Oval 33" descr="Small circle"/>
-            <p:cNvSpPr/>
-            <p:nvPr/>
-          </p:nvSpPr>
-          <p:spPr bwMode="blackWhite">
-            <a:xfrm>
-              <a:off x="7025069" y="711274"/>
-              <a:ext cx="409838" cy="409838"/>
-            </a:xfrm>
-            <a:prstGeom prst="ellipse">
-              <a:avLst/>
-            </a:prstGeom>
-            <a:solidFill>
-              <a:srgbClr val="D24726"/>
-            </a:solidFill>
-            <a:ln>
-              <a:noFill/>
-            </a:ln>
-          </p:spPr>
-          <p:style>
-            <a:lnRef idx="2">
-              <a:schemeClr val="accent1">
-                <a:shade val="50000"/>
-              </a:schemeClr>
-            </a:lnRef>
-            <a:fillRef idx="1">
-              <a:schemeClr val="accent1"/>
-            </a:fillRef>
-            <a:effectRef idx="0">
-              <a:schemeClr val="accent1"/>
-            </a:effectRef>
-            <a:fontRef idx="minor">
-              <a:schemeClr val="lt1"/>
-            </a:fontRef>
-          </p:style>
-          <p:txBody>
-            <a:bodyPr rtlCol="0" anchor="ctr"/>
-            <a:lstStyle/>
-            <a:p>
-              <a:pPr algn="ctr"/>
-              <a:endParaRPr lang="en-US" dirty="0"/>
-            </a:p>
-          </p:txBody>
-        </p:sp>
-        <p:sp>
-          <p:nvSpPr>
-            <p:cNvPr id="35" name="TextBox 34" descr="Number 2"/>
-            <p:cNvSpPr txBox="1">
-              <a:spLocks noChangeAspect="1"/>
-            </p:cNvSpPr>
-            <p:nvPr/>
-          </p:nvSpPr>
-          <p:spPr bwMode="blackWhite">
-            <a:xfrm>
-              <a:off x="6953426" y="727564"/>
-              <a:ext cx="558179" cy="369332"/>
-            </a:xfrm>
-            <a:prstGeom prst="rect">
-              <a:avLst/>
-            </a:prstGeom>
-            <a:noFill/>
-          </p:spPr>
-          <p:txBody>
-            <a:bodyPr wrap="square" rtlCol="0">
-              <a:spAutoFit/>
-            </a:bodyPr>
-            <a:lstStyle/>
-            <a:p>
-              <a:pPr algn="ctr"/>
-              <a:r>
-                <a:rPr lang="en-US" dirty="0">
-                  <a:solidFill>
-                    <a:schemeClr val="bg1"/>
-                  </a:solidFill>
-                  <a:latin typeface="Segoe UI Semibold" panose="020B0702040204020203" pitchFamily="34" charset="0"/>
-                  <a:cs typeface="Segoe UI Semibold" panose="020B0702040204020203" pitchFamily="34" charset="0"/>
-                </a:rPr>
-                <a:t>2</a:t>
-              </a:r>
-            </a:p>
-          </p:txBody>
-        </p:sp>
-      </p:grpSp>
-      <p:sp>
-        <p:nvSpPr>
-          <p:cNvPr id="32" name="Content Placeholder 17"/>
-          <p:cNvSpPr txBox="1">
-            <a:spLocks/>
-          </p:cNvSpPr>
-          <p:nvPr/>
-        </p:nvSpPr>
-        <p:spPr>
-          <a:xfrm>
-            <a:off x="1007978" y="2135243"/>
-            <a:ext cx="4504252" cy="471149"/>
-          </a:xfrm>
-          <a:prstGeom prst="rect">
-            <a:avLst/>
-          </a:prstGeom>
-        </p:spPr>
-        <p:txBody>
-          <a:bodyPr vert="horz" lIns="91440" tIns="45720" rIns="91440" bIns="45720" rtlCol="0">
-            <a:normAutofit/>
-          </a:bodyPr>
-          <a:lstStyle>
-            <a:lvl1pPr marL="228600" indent="-228600" algn="l" defTabSz="914400" rtl="0" eaLnBrk="1" latinLnBrk="0" hangingPunct="1">
-              <a:lnSpc>
-                <a:spcPts val="1800"/>
-              </a:lnSpc>
-              <a:spcBef>
-                <a:spcPts val="1000"/>
-              </a:spcBef>
-              <a:spcAft>
-                <a:spcPts val="1000"/>
-              </a:spcAft>
-              <a:buFont typeface="Arial" panose="020B0604020202020204" pitchFamily="34" charset="0"/>
-              <a:buChar char="•"/>
-              <a:defRPr lang="en-US" sz="1200" kern="1200" smtClean="0">
-                <a:solidFill>
-                  <a:schemeClr val="tx1">
-                    <a:lumMod val="75000"/>
-                    <a:lumOff val="25000"/>
-                  </a:schemeClr>
-                </a:solidFill>
-                <a:latin typeface="+mn-lt"/>
-                <a:ea typeface="+mn-ea"/>
-                <a:cs typeface="+mn-cs"/>
-              </a:defRPr>
-            </a:lvl1pPr>
-            <a:lvl2pPr marL="685800" indent="-228600" algn="l" defTabSz="914400" rtl="0" eaLnBrk="1" latinLnBrk="0" hangingPunct="1">
-              <a:lnSpc>
-                <a:spcPts val="1800"/>
-              </a:lnSpc>
-              <a:spcBef>
-                <a:spcPts val="1000"/>
-              </a:spcBef>
-              <a:spcAft>
-                <a:spcPts val="1000"/>
-              </a:spcAft>
-              <a:buFont typeface="Arial" panose="020B0604020202020204" pitchFamily="34" charset="0"/>
-              <a:buChar char="•"/>
-              <a:defRPr lang="en-US" sz="1200" kern="1200" smtClean="0">
-                <a:solidFill>
-                  <a:schemeClr val="tx1">
-                    <a:lumMod val="75000"/>
-                    <a:lumOff val="25000"/>
-                  </a:schemeClr>
-                </a:solidFill>
-                <a:latin typeface="+mn-lt"/>
-                <a:ea typeface="+mn-ea"/>
-                <a:cs typeface="+mn-cs"/>
-              </a:defRPr>
-            </a:lvl2pPr>
-            <a:lvl3pPr marL="1143000" indent="-228600" algn="l" defTabSz="914400" rtl="0" eaLnBrk="1" latinLnBrk="0" hangingPunct="1">
-              <a:lnSpc>
-                <a:spcPts val="1800"/>
-              </a:lnSpc>
-              <a:spcBef>
-                <a:spcPts val="1000"/>
-              </a:spcBef>
-              <a:spcAft>
-                <a:spcPts val="1000"/>
-              </a:spcAft>
-              <a:buFont typeface="Arial" panose="020B0604020202020204" pitchFamily="34" charset="0"/>
-              <a:buChar char="•"/>
-              <a:defRPr lang="en-US" sz="1200" kern="1200" smtClean="0">
-                <a:solidFill>
-                  <a:schemeClr val="tx1">
-                    <a:lumMod val="75000"/>
-                    <a:lumOff val="25000"/>
-                  </a:schemeClr>
-                </a:solidFill>
-                <a:latin typeface="+mn-lt"/>
-                <a:ea typeface="+mn-ea"/>
-                <a:cs typeface="+mn-cs"/>
-              </a:defRPr>
-            </a:lvl3pPr>
-            <a:lvl4pPr marL="1600200" indent="-228600" algn="l" defTabSz="914400" rtl="0" eaLnBrk="1" latinLnBrk="0" hangingPunct="1">
-              <a:lnSpc>
-                <a:spcPts val="1800"/>
-              </a:lnSpc>
-              <a:spcBef>
-                <a:spcPts val="1000"/>
-              </a:spcBef>
-              <a:spcAft>
-                <a:spcPts val="1000"/>
-              </a:spcAft>
-              <a:buFont typeface="Arial" panose="020B0604020202020204" pitchFamily="34" charset="0"/>
-              <a:buChar char="•"/>
-              <a:defRPr lang="en-US" sz="1200" kern="1200" smtClean="0">
-                <a:solidFill>
-                  <a:schemeClr val="tx1">
-                    <a:lumMod val="75000"/>
-                    <a:lumOff val="25000"/>
-                  </a:schemeClr>
-                </a:solidFill>
-                <a:latin typeface="+mn-lt"/>
-                <a:ea typeface="+mn-ea"/>
-                <a:cs typeface="+mn-cs"/>
-              </a:defRPr>
-            </a:lvl4pPr>
-            <a:lvl5pPr marL="2057400" indent="-228600" algn="l" defTabSz="914400" rtl="0" eaLnBrk="1" latinLnBrk="0" hangingPunct="1">
-              <a:lnSpc>
-                <a:spcPts val="1800"/>
-              </a:lnSpc>
-              <a:spcBef>
-                <a:spcPts val="1000"/>
-              </a:spcBef>
-              <a:spcAft>
-                <a:spcPts val="1000"/>
-              </a:spcAft>
-              <a:buFont typeface="Arial" panose="020B0604020202020204" pitchFamily="34" charset="0"/>
-              <a:buChar char="•"/>
-              <a:defRPr lang="en-US" sz="1200" kern="1200">
-                <a:solidFill>
-                  <a:schemeClr val="tx1">
-                    <a:lumMod val="75000"/>
-                    <a:lumOff val="25000"/>
-                  </a:schemeClr>
-                </a:solidFill>
-                <a:latin typeface="+mn-lt"/>
-                <a:ea typeface="+mn-ea"/>
-                <a:cs typeface="+mn-cs"/>
-              </a:defRPr>
-            </a:lvl5pPr>
-            <a:lvl6pPr marL="2514600" indent="-228600" algn="l" defTabSz="914400" rtl="0" eaLnBrk="1" latinLnBrk="0" hangingPunct="1">
-              <a:lnSpc>
-                <a:spcPct val="90000"/>
-              </a:lnSpc>
-              <a:spcBef>
-                <a:spcPct val="30000"/>
-              </a:spcBef>
-              <a:buFont typeface="Arial" panose="020B0604020202020204" pitchFamily="34" charset="0"/>
-              <a:buChar char="•"/>
-              <a:defRPr sz="1800" kern="1200">
-                <a:solidFill>
-                  <a:schemeClr val="tx1"/>
-                </a:solidFill>
-                <a:latin typeface="+mn-lt"/>
-                <a:ea typeface="+mn-ea"/>
-                <a:cs typeface="+mn-cs"/>
-              </a:defRPr>
-            </a:lvl6pPr>
-            <a:lvl7pPr marL="2971800" indent="-228600" algn="l" defTabSz="914400" rtl="0" eaLnBrk="1" latinLnBrk="0" hangingPunct="1">
-              <a:lnSpc>
-                <a:spcPct val="90000"/>
-              </a:lnSpc>
-              <a:spcBef>
-                <a:spcPct val="30000"/>
-              </a:spcBef>
-              <a:buFont typeface="Arial" panose="020B0604020202020204" pitchFamily="34" charset="0"/>
-              <a:buChar char="•"/>
-              <a:defRPr sz="1800" kern="1200">
-                <a:solidFill>
-                  <a:schemeClr val="tx1"/>
-                </a:solidFill>
-                <a:latin typeface="+mn-lt"/>
-                <a:ea typeface="+mn-ea"/>
-                <a:cs typeface="+mn-cs"/>
-              </a:defRPr>
-            </a:lvl7pPr>
-            <a:lvl8pPr marL="3429000" indent="-228600" algn="l" defTabSz="914400" rtl="0" eaLnBrk="1" latinLnBrk="0" hangingPunct="1">
-              <a:lnSpc>
-                <a:spcPct val="90000"/>
-              </a:lnSpc>
-              <a:spcBef>
-                <a:spcPct val="30000"/>
-              </a:spcBef>
-              <a:buFont typeface="Arial" panose="020B0604020202020204" pitchFamily="34" charset="0"/>
-              <a:buChar char="•"/>
-              <a:defRPr sz="1800" kern="1200">
-                <a:solidFill>
-                  <a:schemeClr val="tx1"/>
-                </a:solidFill>
-                <a:latin typeface="+mn-lt"/>
-                <a:ea typeface="+mn-ea"/>
-                <a:cs typeface="+mn-cs"/>
-              </a:defRPr>
-            </a:lvl8pPr>
-            <a:lvl9pPr marL="3886200" indent="-228600" algn="l" defTabSz="914400" rtl="0" eaLnBrk="1" latinLnBrk="0" hangingPunct="1">
-              <a:lnSpc>
-                <a:spcPct val="90000"/>
-              </a:lnSpc>
-              <a:spcBef>
-                <a:spcPct val="30000"/>
-              </a:spcBef>
-              <a:buFont typeface="Arial" panose="020B0604020202020204" pitchFamily="34" charset="0"/>
-              <a:buChar char="•"/>
-              <a:defRPr sz="1800" kern="1200">
-                <a:solidFill>
-                  <a:schemeClr val="tx1"/>
-                </a:solidFill>
-                <a:latin typeface="+mn-lt"/>
-                <a:ea typeface="+mn-ea"/>
-                <a:cs typeface="+mn-cs"/>
-              </a:defRPr>
-            </a:lvl9pPr>
-          </a:lstStyle>
-          <a:p>
-            <a:pPr marL="0" lvl="0" indent="0">
-              <a:spcAft>
-                <a:spcPts val="600"/>
-              </a:spcAft>
-              <a:buNone/>
-              <a:defRPr/>
-            </a:pPr>
-            <a:r>
-              <a:rPr lang="en-US" sz="2800" b="1" dirty="0"/>
-              <a:t>Functional Testing types</a:t>
-            </a:r>
-            <a:endParaRPr lang="en-US" sz="2800" dirty="0">
-              <a:solidFill>
-                <a:prstClr val="black">
-                  <a:lumMod val="75000"/>
-                  <a:lumOff val="25000"/>
-                </a:prstClr>
-              </a:solidFill>
-              <a:cs typeface="Segoe UI"/>
-            </a:endParaRPr>
-          </a:p>
-        </p:txBody>
-      </p:sp>
-      <p:sp>
-        <p:nvSpPr>
-          <p:cNvPr id="26" name="Content Placeholder 17">
-            <a:extLst>
-              <a:ext uri="{FF2B5EF4-FFF2-40B4-BE49-F238E27FC236}">
-                <a16:creationId xmlns:a16="http://schemas.microsoft.com/office/drawing/2014/main" id="{F3972F21-1995-4BBE-8F7E-2E62D49448EF}"/>
-              </a:ext>
-            </a:extLst>
-          </p:cNvPr>
-          <p:cNvSpPr txBox="1">
-            <a:spLocks/>
-          </p:cNvSpPr>
-          <p:nvPr/>
-        </p:nvSpPr>
-        <p:spPr>
-          <a:xfrm>
-            <a:off x="6720274" y="2075227"/>
-            <a:ext cx="4504252" cy="471149"/>
-          </a:xfrm>
-          <a:prstGeom prst="rect">
-            <a:avLst/>
-          </a:prstGeom>
-        </p:spPr>
-        <p:txBody>
-          <a:bodyPr vert="horz" lIns="91440" tIns="45720" rIns="91440" bIns="45720" rtlCol="0">
-            <a:normAutofit fontScale="85000" lnSpcReduction="10000"/>
-          </a:bodyPr>
-          <a:lstStyle>
-            <a:lvl1pPr marL="228600" indent="-228600" algn="l" defTabSz="914400" rtl="0" eaLnBrk="1" latinLnBrk="0" hangingPunct="1">
-              <a:lnSpc>
-                <a:spcPts val="1800"/>
-              </a:lnSpc>
-              <a:spcBef>
-                <a:spcPts val="1000"/>
-              </a:spcBef>
-              <a:spcAft>
-                <a:spcPts val="1000"/>
-              </a:spcAft>
-              <a:buFont typeface="Arial" panose="020B0604020202020204" pitchFamily="34" charset="0"/>
-              <a:buChar char="•"/>
-              <a:defRPr lang="en-US" sz="1200" kern="1200" smtClean="0">
-                <a:solidFill>
-                  <a:schemeClr val="tx1">
-                    <a:lumMod val="75000"/>
-                    <a:lumOff val="25000"/>
-                  </a:schemeClr>
-                </a:solidFill>
-                <a:latin typeface="+mn-lt"/>
-                <a:ea typeface="+mn-ea"/>
-                <a:cs typeface="+mn-cs"/>
-              </a:defRPr>
-            </a:lvl1pPr>
-            <a:lvl2pPr marL="685800" indent="-228600" algn="l" defTabSz="914400" rtl="0" eaLnBrk="1" latinLnBrk="0" hangingPunct="1">
-              <a:lnSpc>
-                <a:spcPts val="1800"/>
-              </a:lnSpc>
-              <a:spcBef>
-                <a:spcPts val="1000"/>
-              </a:spcBef>
-              <a:spcAft>
-                <a:spcPts val="1000"/>
-              </a:spcAft>
-              <a:buFont typeface="Arial" panose="020B0604020202020204" pitchFamily="34" charset="0"/>
-              <a:buChar char="•"/>
-              <a:defRPr lang="en-US" sz="1200" kern="1200" smtClean="0">
-                <a:solidFill>
-                  <a:schemeClr val="tx1">
-                    <a:lumMod val="75000"/>
-                    <a:lumOff val="25000"/>
-                  </a:schemeClr>
-                </a:solidFill>
-                <a:latin typeface="+mn-lt"/>
-                <a:ea typeface="+mn-ea"/>
-                <a:cs typeface="+mn-cs"/>
-              </a:defRPr>
-            </a:lvl2pPr>
-            <a:lvl3pPr marL="1143000" indent="-228600" algn="l" defTabSz="914400" rtl="0" eaLnBrk="1" latinLnBrk="0" hangingPunct="1">
-              <a:lnSpc>
-                <a:spcPts val="1800"/>
-              </a:lnSpc>
-              <a:spcBef>
-                <a:spcPts val="1000"/>
-              </a:spcBef>
-              <a:spcAft>
-                <a:spcPts val="1000"/>
-              </a:spcAft>
-              <a:buFont typeface="Arial" panose="020B0604020202020204" pitchFamily="34" charset="0"/>
-              <a:buChar char="•"/>
-              <a:defRPr lang="en-US" sz="1200" kern="1200" smtClean="0">
-                <a:solidFill>
-                  <a:schemeClr val="tx1">
-                    <a:lumMod val="75000"/>
-                    <a:lumOff val="25000"/>
-                  </a:schemeClr>
-                </a:solidFill>
-                <a:latin typeface="+mn-lt"/>
-                <a:ea typeface="+mn-ea"/>
-                <a:cs typeface="+mn-cs"/>
-              </a:defRPr>
-            </a:lvl3pPr>
-            <a:lvl4pPr marL="1600200" indent="-228600" algn="l" defTabSz="914400" rtl="0" eaLnBrk="1" latinLnBrk="0" hangingPunct="1">
-              <a:lnSpc>
-                <a:spcPts val="1800"/>
-              </a:lnSpc>
-              <a:spcBef>
-                <a:spcPts val="1000"/>
-              </a:spcBef>
-              <a:spcAft>
-                <a:spcPts val="1000"/>
-              </a:spcAft>
-              <a:buFont typeface="Arial" panose="020B0604020202020204" pitchFamily="34" charset="0"/>
-              <a:buChar char="•"/>
-              <a:defRPr lang="en-US" sz="1200" kern="1200" smtClean="0">
-                <a:solidFill>
-                  <a:schemeClr val="tx1">
-                    <a:lumMod val="75000"/>
-                    <a:lumOff val="25000"/>
-                  </a:schemeClr>
-                </a:solidFill>
-                <a:latin typeface="+mn-lt"/>
-                <a:ea typeface="+mn-ea"/>
-                <a:cs typeface="+mn-cs"/>
-              </a:defRPr>
-            </a:lvl4pPr>
-            <a:lvl5pPr marL="2057400" indent="-228600" algn="l" defTabSz="914400" rtl="0" eaLnBrk="1" latinLnBrk="0" hangingPunct="1">
-              <a:lnSpc>
-                <a:spcPts val="1800"/>
-              </a:lnSpc>
-              <a:spcBef>
-                <a:spcPts val="1000"/>
-              </a:spcBef>
-              <a:spcAft>
-                <a:spcPts val="1000"/>
-              </a:spcAft>
-              <a:buFont typeface="Arial" panose="020B0604020202020204" pitchFamily="34" charset="0"/>
-              <a:buChar char="•"/>
-              <a:defRPr lang="en-US" sz="1200" kern="1200">
-                <a:solidFill>
-                  <a:schemeClr val="tx1">
-                    <a:lumMod val="75000"/>
-                    <a:lumOff val="25000"/>
-                  </a:schemeClr>
-                </a:solidFill>
-                <a:latin typeface="+mn-lt"/>
-                <a:ea typeface="+mn-ea"/>
-                <a:cs typeface="+mn-cs"/>
-              </a:defRPr>
-            </a:lvl5pPr>
-            <a:lvl6pPr marL="2514600" indent="-228600" algn="l" defTabSz="914400" rtl="0" eaLnBrk="1" latinLnBrk="0" hangingPunct="1">
-              <a:lnSpc>
-                <a:spcPct val="90000"/>
-              </a:lnSpc>
-              <a:spcBef>
-                <a:spcPct val="30000"/>
-              </a:spcBef>
-              <a:buFont typeface="Arial" panose="020B0604020202020204" pitchFamily="34" charset="0"/>
-              <a:buChar char="•"/>
-              <a:defRPr sz="1800" kern="1200">
-                <a:solidFill>
-                  <a:schemeClr val="tx1"/>
-                </a:solidFill>
-                <a:latin typeface="+mn-lt"/>
-                <a:ea typeface="+mn-ea"/>
-                <a:cs typeface="+mn-cs"/>
-              </a:defRPr>
-            </a:lvl6pPr>
-            <a:lvl7pPr marL="2971800" indent="-228600" algn="l" defTabSz="914400" rtl="0" eaLnBrk="1" latinLnBrk="0" hangingPunct="1">
-              <a:lnSpc>
-                <a:spcPct val="90000"/>
-              </a:lnSpc>
-              <a:spcBef>
-                <a:spcPct val="30000"/>
-              </a:spcBef>
-              <a:buFont typeface="Arial" panose="020B0604020202020204" pitchFamily="34" charset="0"/>
-              <a:buChar char="•"/>
-              <a:defRPr sz="1800" kern="1200">
-                <a:solidFill>
-                  <a:schemeClr val="tx1"/>
-                </a:solidFill>
-                <a:latin typeface="+mn-lt"/>
-                <a:ea typeface="+mn-ea"/>
-                <a:cs typeface="+mn-cs"/>
-              </a:defRPr>
-            </a:lvl7pPr>
-            <a:lvl8pPr marL="3429000" indent="-228600" algn="l" defTabSz="914400" rtl="0" eaLnBrk="1" latinLnBrk="0" hangingPunct="1">
-              <a:lnSpc>
-                <a:spcPct val="90000"/>
-              </a:lnSpc>
-              <a:spcBef>
-                <a:spcPct val="30000"/>
-              </a:spcBef>
-              <a:buFont typeface="Arial" panose="020B0604020202020204" pitchFamily="34" charset="0"/>
-              <a:buChar char="•"/>
-              <a:defRPr sz="1800" kern="1200">
-                <a:solidFill>
-                  <a:schemeClr val="tx1"/>
-                </a:solidFill>
-                <a:latin typeface="+mn-lt"/>
-                <a:ea typeface="+mn-ea"/>
-                <a:cs typeface="+mn-cs"/>
-              </a:defRPr>
-            </a:lvl8pPr>
-            <a:lvl9pPr marL="3886200" indent="-228600" algn="l" defTabSz="914400" rtl="0" eaLnBrk="1" latinLnBrk="0" hangingPunct="1">
-              <a:lnSpc>
-                <a:spcPct val="90000"/>
-              </a:lnSpc>
-              <a:spcBef>
-                <a:spcPct val="30000"/>
-              </a:spcBef>
-              <a:buFont typeface="Arial" panose="020B0604020202020204" pitchFamily="34" charset="0"/>
-              <a:buChar char="•"/>
-              <a:defRPr sz="1800" kern="1200">
-                <a:solidFill>
-                  <a:schemeClr val="tx1"/>
-                </a:solidFill>
-                <a:latin typeface="+mn-lt"/>
-                <a:ea typeface="+mn-ea"/>
-                <a:cs typeface="+mn-cs"/>
-              </a:defRPr>
-            </a:lvl9pPr>
-          </a:lstStyle>
-          <a:p>
-            <a:pPr marL="0" lvl="0" indent="0">
-              <a:spcAft>
-                <a:spcPts val="600"/>
-              </a:spcAft>
-              <a:buNone/>
-              <a:defRPr/>
-            </a:pPr>
-            <a:r>
-              <a:rPr lang="en-US" sz="2800" b="1" dirty="0"/>
-              <a:t>Non-functional Testing types</a:t>
-            </a:r>
-          </a:p>
-        </p:txBody>
-      </p:sp>
-      <p:sp>
-        <p:nvSpPr>
-          <p:cNvPr id="2" name="Rectangle 1">
-            <a:extLst>
-              <a:ext uri="{FF2B5EF4-FFF2-40B4-BE49-F238E27FC236}">
-                <a16:creationId xmlns:a16="http://schemas.microsoft.com/office/drawing/2014/main" id="{C0703CB6-DC64-4593-9087-5A3DDCB3049F}"/>
-              </a:ext>
-            </a:extLst>
-          </p:cNvPr>
-          <p:cNvSpPr/>
-          <p:nvPr/>
-        </p:nvSpPr>
-        <p:spPr>
-          <a:xfrm>
-            <a:off x="995468" y="2475619"/>
-            <a:ext cx="4677612" cy="4031873"/>
-          </a:xfrm>
-          <a:prstGeom prst="rect">
-            <a:avLst/>
-          </a:prstGeom>
-        </p:spPr>
-        <p:txBody>
-          <a:bodyPr wrap="square">
-            <a:spAutoFit/>
-          </a:bodyPr>
-          <a:lstStyle/>
-          <a:p>
-            <a:pPr marL="285750" indent="-285750">
-              <a:buFont typeface="Wingdings" panose="05000000000000000000" pitchFamily="2" charset="2"/>
-              <a:buChar char="q"/>
-            </a:pPr>
-            <a:r>
-              <a:rPr lang="en-US" sz="3200" dirty="0">
-                <a:solidFill>
-                  <a:srgbClr val="3A3A3A"/>
-                </a:solidFill>
-                <a:latin typeface="Work Sans"/>
-              </a:rPr>
-              <a:t>Unit Testing</a:t>
-            </a:r>
-          </a:p>
-          <a:p>
-            <a:pPr marL="285750" indent="-285750">
-              <a:buFont typeface="Wingdings" panose="05000000000000000000" pitchFamily="2" charset="2"/>
-              <a:buChar char="q"/>
-            </a:pPr>
-            <a:r>
-              <a:rPr lang="en-US" sz="3200" dirty="0">
-                <a:solidFill>
-                  <a:srgbClr val="3A3A3A"/>
-                </a:solidFill>
-                <a:latin typeface="Work Sans"/>
-              </a:rPr>
-              <a:t>Integration Testing</a:t>
-            </a:r>
-          </a:p>
-          <a:p>
-            <a:pPr marL="285750" indent="-285750">
-              <a:buFont typeface="Wingdings" panose="05000000000000000000" pitchFamily="2" charset="2"/>
-              <a:buChar char="q"/>
-            </a:pPr>
-            <a:r>
-              <a:rPr lang="en-US" sz="3200" dirty="0">
-                <a:solidFill>
-                  <a:srgbClr val="3A3A3A"/>
-                </a:solidFill>
-                <a:latin typeface="Work Sans"/>
-              </a:rPr>
-              <a:t>System Testing</a:t>
-            </a:r>
-          </a:p>
-          <a:p>
-            <a:pPr marL="285750" indent="-285750">
-              <a:buFont typeface="Wingdings" panose="05000000000000000000" pitchFamily="2" charset="2"/>
-              <a:buChar char="q"/>
-            </a:pPr>
-            <a:r>
-              <a:rPr lang="en-US" sz="3200" dirty="0">
-                <a:solidFill>
-                  <a:srgbClr val="3A3A3A"/>
-                </a:solidFill>
-                <a:latin typeface="Work Sans"/>
-              </a:rPr>
-              <a:t>Sanity Testing</a:t>
-            </a:r>
-          </a:p>
-          <a:p>
-            <a:pPr marL="285750" indent="-285750">
-              <a:buFont typeface="Wingdings" panose="05000000000000000000" pitchFamily="2" charset="2"/>
-              <a:buChar char="q"/>
-            </a:pPr>
-            <a:r>
-              <a:rPr lang="en-US" sz="3200" dirty="0">
-                <a:solidFill>
-                  <a:srgbClr val="3A3A3A"/>
-                </a:solidFill>
-                <a:latin typeface="Work Sans"/>
-              </a:rPr>
-              <a:t>Smoke Testing</a:t>
-            </a:r>
-          </a:p>
-          <a:p>
-            <a:pPr marL="285750" indent="-285750">
-              <a:buFont typeface="Wingdings" panose="05000000000000000000" pitchFamily="2" charset="2"/>
-              <a:buChar char="q"/>
-            </a:pPr>
-            <a:r>
-              <a:rPr lang="en-US" sz="3200" dirty="0">
-                <a:solidFill>
-                  <a:srgbClr val="3A3A3A"/>
-                </a:solidFill>
-                <a:latin typeface="Work Sans"/>
-              </a:rPr>
-              <a:t>Interface Testing</a:t>
-            </a:r>
-          </a:p>
-          <a:p>
-            <a:pPr marL="285750" indent="-285750">
-              <a:buFont typeface="Wingdings" panose="05000000000000000000" pitchFamily="2" charset="2"/>
-              <a:buChar char="q"/>
-            </a:pPr>
-            <a:r>
-              <a:rPr lang="en-US" sz="3200" dirty="0">
-                <a:solidFill>
-                  <a:srgbClr val="3A3A3A"/>
-                </a:solidFill>
-                <a:latin typeface="Work Sans"/>
-              </a:rPr>
-              <a:t>Regression Testing</a:t>
-            </a:r>
-          </a:p>
-          <a:p>
-            <a:pPr marL="285750" indent="-285750">
-              <a:buFont typeface="Wingdings" panose="05000000000000000000" pitchFamily="2" charset="2"/>
-              <a:buChar char="q"/>
-            </a:pPr>
-            <a:r>
-              <a:rPr lang="en-US" sz="3200" dirty="0">
-                <a:solidFill>
-                  <a:srgbClr val="3A3A3A"/>
-                </a:solidFill>
-                <a:latin typeface="Work Sans"/>
-              </a:rPr>
-              <a:t>Beta/Acceptance Testing</a:t>
-            </a:r>
-            <a:endParaRPr lang="en-US" sz="3200" b="0" i="0" dirty="0">
-              <a:solidFill>
-                <a:srgbClr val="3A3A3A"/>
-              </a:solidFill>
-              <a:effectLst/>
-              <a:latin typeface="Work Sans"/>
-            </a:endParaRPr>
-          </a:p>
-        </p:txBody>
-      </p:sp>
-      <p:sp>
-        <p:nvSpPr>
-          <p:cNvPr id="27" name="Rectangle 26">
-            <a:extLst>
-              <a:ext uri="{FF2B5EF4-FFF2-40B4-BE49-F238E27FC236}">
-                <a16:creationId xmlns:a16="http://schemas.microsoft.com/office/drawing/2014/main" id="{3F351963-6621-4385-8877-7B90A8AF42EE}"/>
-              </a:ext>
-            </a:extLst>
-          </p:cNvPr>
-          <p:cNvSpPr/>
-          <p:nvPr/>
-        </p:nvSpPr>
-        <p:spPr>
-          <a:xfrm>
-            <a:off x="6679772" y="2327092"/>
-            <a:ext cx="4677612" cy="4031873"/>
-          </a:xfrm>
-          <a:prstGeom prst="rect">
-            <a:avLst/>
-          </a:prstGeom>
-        </p:spPr>
-        <p:txBody>
-          <a:bodyPr wrap="square">
-            <a:spAutoFit/>
-          </a:bodyPr>
-          <a:lstStyle/>
-          <a:p>
-            <a:pPr marL="285750" indent="-285750">
-              <a:buFont typeface="Wingdings" panose="05000000000000000000" pitchFamily="2" charset="2"/>
-              <a:buChar char="q"/>
-            </a:pPr>
-            <a:r>
-              <a:rPr lang="en-US" sz="3200" dirty="0">
-                <a:solidFill>
-                  <a:srgbClr val="3A3A3A"/>
-                </a:solidFill>
-                <a:latin typeface="Work Sans"/>
-              </a:rPr>
-              <a:t>Performance Testing</a:t>
-            </a:r>
-          </a:p>
-          <a:p>
-            <a:pPr marL="285750" indent="-285750">
-              <a:buFont typeface="Wingdings" panose="05000000000000000000" pitchFamily="2" charset="2"/>
-              <a:buChar char="q"/>
-            </a:pPr>
-            <a:r>
-              <a:rPr lang="en-US" sz="3200" dirty="0">
-                <a:solidFill>
-                  <a:srgbClr val="3A3A3A"/>
-                </a:solidFill>
-                <a:latin typeface="Work Sans"/>
-              </a:rPr>
-              <a:t>Load Testing</a:t>
-            </a:r>
-          </a:p>
-          <a:p>
-            <a:pPr marL="285750" indent="-285750">
-              <a:buFont typeface="Wingdings" panose="05000000000000000000" pitchFamily="2" charset="2"/>
-              <a:buChar char="q"/>
-            </a:pPr>
-            <a:r>
-              <a:rPr lang="en-US" sz="3200" dirty="0">
-                <a:solidFill>
-                  <a:srgbClr val="3A3A3A"/>
-                </a:solidFill>
-                <a:latin typeface="Work Sans"/>
-              </a:rPr>
-              <a:t>Stress Testing</a:t>
-            </a:r>
-          </a:p>
-          <a:p>
-            <a:pPr marL="285750" indent="-285750">
-              <a:buFont typeface="Wingdings" panose="05000000000000000000" pitchFamily="2" charset="2"/>
-              <a:buChar char="q"/>
-            </a:pPr>
-            <a:r>
-              <a:rPr lang="en-US" sz="3200" dirty="0">
-                <a:solidFill>
-                  <a:srgbClr val="3A3A3A"/>
-                </a:solidFill>
-                <a:latin typeface="Work Sans"/>
-              </a:rPr>
-              <a:t>Volume Testing</a:t>
-            </a:r>
-          </a:p>
-          <a:p>
-            <a:pPr marL="285750" indent="-285750">
-              <a:buFont typeface="Wingdings" panose="05000000000000000000" pitchFamily="2" charset="2"/>
-              <a:buChar char="q"/>
-            </a:pPr>
-            <a:r>
-              <a:rPr lang="en-US" sz="3200" dirty="0">
-                <a:solidFill>
-                  <a:srgbClr val="3A3A3A"/>
-                </a:solidFill>
-                <a:latin typeface="Work Sans"/>
-              </a:rPr>
-              <a:t>Security Testing</a:t>
-            </a:r>
-          </a:p>
-          <a:p>
-            <a:pPr marL="285750" indent="-285750">
-              <a:buFont typeface="Wingdings" panose="05000000000000000000" pitchFamily="2" charset="2"/>
-              <a:buChar char="q"/>
-            </a:pPr>
-            <a:r>
-              <a:rPr lang="en-US" sz="3200" dirty="0">
-                <a:solidFill>
-                  <a:srgbClr val="3A3A3A"/>
-                </a:solidFill>
-                <a:latin typeface="Work Sans"/>
-              </a:rPr>
-              <a:t>Compatibility Testing</a:t>
-            </a:r>
-          </a:p>
-          <a:p>
-            <a:pPr marL="285750" indent="-285750">
-              <a:buFont typeface="Wingdings" panose="05000000000000000000" pitchFamily="2" charset="2"/>
-              <a:buChar char="q"/>
-            </a:pPr>
-            <a:r>
-              <a:rPr lang="en-US" sz="3200" dirty="0">
-                <a:solidFill>
-                  <a:srgbClr val="3A3A3A"/>
-                </a:solidFill>
-                <a:latin typeface="Work Sans"/>
-              </a:rPr>
-              <a:t>Install Testing</a:t>
-            </a:r>
-          </a:p>
-          <a:p>
-            <a:pPr marL="285750" indent="-285750">
-              <a:buFont typeface="Wingdings" panose="05000000000000000000" pitchFamily="2" charset="2"/>
-              <a:buChar char="q"/>
-            </a:pPr>
-            <a:r>
-              <a:rPr lang="en-US" sz="3200" dirty="0">
-                <a:solidFill>
-                  <a:srgbClr val="3A3A3A"/>
-                </a:solidFill>
-                <a:latin typeface="Work Sans"/>
-              </a:rPr>
-              <a:t>etc.</a:t>
-            </a:r>
-          </a:p>
-        </p:txBody>
-      </p:sp>
       <p:sp>
         <p:nvSpPr>
           <p:cNvPr id="3" name="Rectangle 2">
@@ -13599,6 +13647,89 @@
       <p:transition/>
     </mc:Fallback>
   </mc:AlternateContent>
+  <p:timing>
+    <p:tnLst>
+      <p:par>
+        <p:cTn id="1" dur="indefinite" restart="never" nodeType="tmRoot">
+          <p:childTnLst>
+            <p:seq concurrent="1" nextAc="seek">
+              <p:cTn id="2" dur="indefinite" nodeType="mainSeq">
+                <p:childTnLst>
+                  <p:par>
+                    <p:cTn id="3" fill="hold">
+                      <p:stCondLst>
+                        <p:cond delay="indefinite"/>
+                      </p:stCondLst>
+                      <p:childTnLst>
+                        <p:par>
+                          <p:cTn id="4" fill="hold">
+                            <p:stCondLst>
+                              <p:cond delay="0"/>
+                            </p:stCondLst>
+                            <p:childTnLst>
+                              <p:par>
+                                <p:cTn id="5" presetID="10" presetClass="entr" presetSubtype="0" fill="hold" nodeType="clickEffect">
+                                  <p:stCondLst>
+                                    <p:cond delay="0"/>
+                                  </p:stCondLst>
+                                  <p:childTnLst>
+                                    <p:set>
+                                      <p:cBhvr>
+                                        <p:cTn id="6" dur="1" fill="hold">
+                                          <p:stCondLst>
+                                            <p:cond delay="0"/>
+                                          </p:stCondLst>
+                                        </p:cTn>
+                                        <p:tgtEl>
+                                          <p:spTgt spid="6"/>
+                                        </p:tgtEl>
+                                        <p:attrNameLst>
+                                          <p:attrName>style.visibility</p:attrName>
+                                        </p:attrNameLst>
+                                      </p:cBhvr>
+                                      <p:to>
+                                        <p:strVal val="visible"/>
+                                      </p:to>
+                                    </p:set>
+                                    <p:animEffect transition="in" filter="fade">
+                                      <p:cBhvr>
+                                        <p:cTn id="7" dur="500"/>
+                                        <p:tgtEl>
+                                          <p:spTgt spid="6"/>
+                                        </p:tgtEl>
+                                      </p:cBhvr>
+                                    </p:animEffect>
+                                  </p:childTnLst>
+                                </p:cTn>
+                              </p:par>
+                            </p:childTnLst>
+                          </p:cTn>
+                        </p:par>
+                      </p:childTnLst>
+                    </p:cTn>
+                  </p:par>
+                </p:childTnLst>
+              </p:cTn>
+              <p:prevCondLst>
+                <p:cond evt="onPrev" delay="0">
+                  <p:tgtEl>
+                    <p:sldTgt/>
+                  </p:tgtEl>
+                </p:cond>
+              </p:prevCondLst>
+              <p:nextCondLst>
+                <p:cond evt="onNext" delay="0">
+                  <p:tgtEl>
+                    <p:sldTgt/>
+                  </p:tgtEl>
+                </p:cond>
+              </p:nextCondLst>
+            </p:seq>
+          </p:childTnLst>
+        </p:cTn>
+      </p:par>
+    </p:tnLst>
+  </p:timing>
 </p:sld>
 </file>
 
@@ -20808,6 +20939,89 @@
       <p:transition/>
     </mc:Fallback>
   </mc:AlternateContent>
+  <p:timing>
+    <p:tnLst>
+      <p:par>
+        <p:cTn id="1" dur="indefinite" restart="never" nodeType="tmRoot">
+          <p:childTnLst>
+            <p:seq concurrent="1" nextAc="seek">
+              <p:cTn id="2" dur="indefinite" nodeType="mainSeq">
+                <p:childTnLst>
+                  <p:par>
+                    <p:cTn id="3" fill="hold">
+                      <p:stCondLst>
+                        <p:cond delay="indefinite"/>
+                      </p:stCondLst>
+                      <p:childTnLst>
+                        <p:par>
+                          <p:cTn id="4" fill="hold">
+                            <p:stCondLst>
+                              <p:cond delay="0"/>
+                            </p:stCondLst>
+                            <p:childTnLst>
+                              <p:par>
+                                <p:cTn id="5" presetID="10" presetClass="entr" presetSubtype="0" fill="hold" nodeType="clickEffect">
+                                  <p:stCondLst>
+                                    <p:cond delay="0"/>
+                                  </p:stCondLst>
+                                  <p:childTnLst>
+                                    <p:set>
+                                      <p:cBhvr>
+                                        <p:cTn id="6" dur="1" fill="hold">
+                                          <p:stCondLst>
+                                            <p:cond delay="0"/>
+                                          </p:stCondLst>
+                                        </p:cTn>
+                                        <p:tgtEl>
+                                          <p:spTgt spid="5"/>
+                                        </p:tgtEl>
+                                        <p:attrNameLst>
+                                          <p:attrName>style.visibility</p:attrName>
+                                        </p:attrNameLst>
+                                      </p:cBhvr>
+                                      <p:to>
+                                        <p:strVal val="visible"/>
+                                      </p:to>
+                                    </p:set>
+                                    <p:animEffect transition="in" filter="fade">
+                                      <p:cBhvr>
+                                        <p:cTn id="7" dur="500"/>
+                                        <p:tgtEl>
+                                          <p:spTgt spid="5"/>
+                                        </p:tgtEl>
+                                      </p:cBhvr>
+                                    </p:animEffect>
+                                  </p:childTnLst>
+                                </p:cTn>
+                              </p:par>
+                            </p:childTnLst>
+                          </p:cTn>
+                        </p:par>
+                      </p:childTnLst>
+                    </p:cTn>
+                  </p:par>
+                </p:childTnLst>
+              </p:cTn>
+              <p:prevCondLst>
+                <p:cond evt="onPrev" delay="0">
+                  <p:tgtEl>
+                    <p:sldTgt/>
+                  </p:tgtEl>
+                </p:cond>
+              </p:prevCondLst>
+              <p:nextCondLst>
+                <p:cond evt="onNext" delay="0">
+                  <p:tgtEl>
+                    <p:sldTgt/>
+                  </p:tgtEl>
+                </p:cond>
+              </p:nextCondLst>
+            </p:seq>
+          </p:childTnLst>
+        </p:cTn>
+      </p:par>
+    </p:tnLst>
+  </p:timing>
 </p:sld>
 </file>
 
@@ -28511,6 +28725,362 @@
       <p:transition/>
     </mc:Fallback>
   </mc:AlternateContent>
+  <p:timing>
+    <p:tnLst>
+      <p:par>
+        <p:cTn id="1" dur="indefinite" restart="never" nodeType="tmRoot">
+          <p:childTnLst>
+            <p:seq concurrent="1" nextAc="seek">
+              <p:cTn id="2" dur="indefinite" nodeType="mainSeq">
+                <p:childTnLst>
+                  <p:par>
+                    <p:cTn id="3" fill="hold">
+                      <p:stCondLst>
+                        <p:cond delay="indefinite"/>
+                      </p:stCondLst>
+                      <p:childTnLst>
+                        <p:par>
+                          <p:cTn id="4" fill="hold">
+                            <p:stCondLst>
+                              <p:cond delay="0"/>
+                            </p:stCondLst>
+                            <p:childTnLst>
+                              <p:par>
+                                <p:cTn id="5" presetID="10" presetClass="entr" presetSubtype="0" fill="hold" grpId="0" nodeType="clickEffect">
+                                  <p:stCondLst>
+                                    <p:cond delay="0"/>
+                                  </p:stCondLst>
+                                  <p:childTnLst>
+                                    <p:set>
+                                      <p:cBhvr>
+                                        <p:cTn id="6" dur="1" fill="hold">
+                                          <p:stCondLst>
+                                            <p:cond delay="0"/>
+                                          </p:stCondLst>
+                                        </p:cTn>
+                                        <p:tgtEl>
+                                          <p:spTgt spid="2"/>
+                                        </p:tgtEl>
+                                        <p:attrNameLst>
+                                          <p:attrName>style.visibility</p:attrName>
+                                        </p:attrNameLst>
+                                      </p:cBhvr>
+                                      <p:to>
+                                        <p:strVal val="visible"/>
+                                      </p:to>
+                                    </p:set>
+                                    <p:animEffect transition="in" filter="fade">
+                                      <p:cBhvr>
+                                        <p:cTn id="7" dur="500"/>
+                                        <p:tgtEl>
+                                          <p:spTgt spid="2"/>
+                                        </p:tgtEl>
+                                      </p:cBhvr>
+                                    </p:animEffect>
+                                  </p:childTnLst>
+                                </p:cTn>
+                              </p:par>
+                              <p:par>
+                                <p:cTn id="8" presetID="10" presetClass="entr" presetSubtype="0" fill="hold" grpId="0" nodeType="withEffect">
+                                  <p:stCondLst>
+                                    <p:cond delay="0"/>
+                                  </p:stCondLst>
+                                  <p:childTnLst>
+                                    <p:set>
+                                      <p:cBhvr>
+                                        <p:cTn id="9" dur="1" fill="hold">
+                                          <p:stCondLst>
+                                            <p:cond delay="0"/>
+                                          </p:stCondLst>
+                                        </p:cTn>
+                                        <p:tgtEl>
+                                          <p:spTgt spid="21"/>
+                                        </p:tgtEl>
+                                        <p:attrNameLst>
+                                          <p:attrName>style.visibility</p:attrName>
+                                        </p:attrNameLst>
+                                      </p:cBhvr>
+                                      <p:to>
+                                        <p:strVal val="visible"/>
+                                      </p:to>
+                                    </p:set>
+                                    <p:animEffect transition="in" filter="fade">
+                                      <p:cBhvr>
+                                        <p:cTn id="10" dur="500"/>
+                                        <p:tgtEl>
+                                          <p:spTgt spid="21"/>
+                                        </p:tgtEl>
+                                      </p:cBhvr>
+                                    </p:animEffect>
+                                  </p:childTnLst>
+                                </p:cTn>
+                              </p:par>
+                            </p:childTnLst>
+                          </p:cTn>
+                        </p:par>
+                      </p:childTnLst>
+                    </p:cTn>
+                  </p:par>
+                  <p:par>
+                    <p:cTn id="11" fill="hold">
+                      <p:stCondLst>
+                        <p:cond delay="indefinite"/>
+                      </p:stCondLst>
+                      <p:childTnLst>
+                        <p:par>
+                          <p:cTn id="12" fill="hold">
+                            <p:stCondLst>
+                              <p:cond delay="0"/>
+                            </p:stCondLst>
+                            <p:childTnLst>
+                              <p:par>
+                                <p:cTn id="13" presetID="10" presetClass="entr" presetSubtype="0" fill="hold" grpId="0" nodeType="clickEffect">
+                                  <p:stCondLst>
+                                    <p:cond delay="0"/>
+                                  </p:stCondLst>
+                                  <p:childTnLst>
+                                    <p:set>
+                                      <p:cBhvr>
+                                        <p:cTn id="14" dur="1" fill="hold">
+                                          <p:stCondLst>
+                                            <p:cond delay="0"/>
+                                          </p:stCondLst>
+                                        </p:cTn>
+                                        <p:tgtEl>
+                                          <p:spTgt spid="22"/>
+                                        </p:tgtEl>
+                                        <p:attrNameLst>
+                                          <p:attrName>style.visibility</p:attrName>
+                                        </p:attrNameLst>
+                                      </p:cBhvr>
+                                      <p:to>
+                                        <p:strVal val="visible"/>
+                                      </p:to>
+                                    </p:set>
+                                    <p:animEffect transition="in" filter="fade">
+                                      <p:cBhvr>
+                                        <p:cTn id="15" dur="500"/>
+                                        <p:tgtEl>
+                                          <p:spTgt spid="22"/>
+                                        </p:tgtEl>
+                                      </p:cBhvr>
+                                    </p:animEffect>
+                                  </p:childTnLst>
+                                </p:cTn>
+                              </p:par>
+                              <p:par>
+                                <p:cTn id="16" presetID="10" presetClass="entr" presetSubtype="0" fill="hold" grpId="0" nodeType="withEffect">
+                                  <p:stCondLst>
+                                    <p:cond delay="0"/>
+                                  </p:stCondLst>
+                                  <p:childTnLst>
+                                    <p:set>
+                                      <p:cBhvr>
+                                        <p:cTn id="17" dur="1" fill="hold">
+                                          <p:stCondLst>
+                                            <p:cond delay="0"/>
+                                          </p:stCondLst>
+                                        </p:cTn>
+                                        <p:tgtEl>
+                                          <p:spTgt spid="23"/>
+                                        </p:tgtEl>
+                                        <p:attrNameLst>
+                                          <p:attrName>style.visibility</p:attrName>
+                                        </p:attrNameLst>
+                                      </p:cBhvr>
+                                      <p:to>
+                                        <p:strVal val="visible"/>
+                                      </p:to>
+                                    </p:set>
+                                    <p:animEffect transition="in" filter="fade">
+                                      <p:cBhvr>
+                                        <p:cTn id="18" dur="500"/>
+                                        <p:tgtEl>
+                                          <p:spTgt spid="23"/>
+                                        </p:tgtEl>
+                                      </p:cBhvr>
+                                    </p:animEffect>
+                                  </p:childTnLst>
+                                </p:cTn>
+                              </p:par>
+                            </p:childTnLst>
+                          </p:cTn>
+                        </p:par>
+                      </p:childTnLst>
+                    </p:cTn>
+                  </p:par>
+                  <p:par>
+                    <p:cTn id="19" fill="hold">
+                      <p:stCondLst>
+                        <p:cond delay="indefinite"/>
+                      </p:stCondLst>
+                      <p:childTnLst>
+                        <p:par>
+                          <p:cTn id="20" fill="hold">
+                            <p:stCondLst>
+                              <p:cond delay="0"/>
+                            </p:stCondLst>
+                            <p:childTnLst>
+                              <p:par>
+                                <p:cTn id="21" presetID="10" presetClass="entr" presetSubtype="0" fill="hold" grpId="0" nodeType="clickEffect">
+                                  <p:stCondLst>
+                                    <p:cond delay="0"/>
+                                  </p:stCondLst>
+                                  <p:childTnLst>
+                                    <p:set>
+                                      <p:cBhvr>
+                                        <p:cTn id="22" dur="1" fill="hold">
+                                          <p:stCondLst>
+                                            <p:cond delay="0"/>
+                                          </p:stCondLst>
+                                        </p:cTn>
+                                        <p:tgtEl>
+                                          <p:spTgt spid="24"/>
+                                        </p:tgtEl>
+                                        <p:attrNameLst>
+                                          <p:attrName>style.visibility</p:attrName>
+                                        </p:attrNameLst>
+                                      </p:cBhvr>
+                                      <p:to>
+                                        <p:strVal val="visible"/>
+                                      </p:to>
+                                    </p:set>
+                                    <p:animEffect transition="in" filter="fade">
+                                      <p:cBhvr>
+                                        <p:cTn id="23" dur="500"/>
+                                        <p:tgtEl>
+                                          <p:spTgt spid="24"/>
+                                        </p:tgtEl>
+                                      </p:cBhvr>
+                                    </p:animEffect>
+                                  </p:childTnLst>
+                                </p:cTn>
+                              </p:par>
+                              <p:par>
+                                <p:cTn id="24" presetID="10" presetClass="entr" presetSubtype="0" fill="hold" grpId="0" nodeType="withEffect">
+                                  <p:stCondLst>
+                                    <p:cond delay="0"/>
+                                  </p:stCondLst>
+                                  <p:childTnLst>
+                                    <p:set>
+                                      <p:cBhvr>
+                                        <p:cTn id="25" dur="1" fill="hold">
+                                          <p:stCondLst>
+                                            <p:cond delay="0"/>
+                                          </p:stCondLst>
+                                        </p:cTn>
+                                        <p:tgtEl>
+                                          <p:spTgt spid="25"/>
+                                        </p:tgtEl>
+                                        <p:attrNameLst>
+                                          <p:attrName>style.visibility</p:attrName>
+                                        </p:attrNameLst>
+                                      </p:cBhvr>
+                                      <p:to>
+                                        <p:strVal val="visible"/>
+                                      </p:to>
+                                    </p:set>
+                                    <p:animEffect transition="in" filter="fade">
+                                      <p:cBhvr>
+                                        <p:cTn id="26" dur="500"/>
+                                        <p:tgtEl>
+                                          <p:spTgt spid="25"/>
+                                        </p:tgtEl>
+                                      </p:cBhvr>
+                                    </p:animEffect>
+                                  </p:childTnLst>
+                                </p:cTn>
+                              </p:par>
+                            </p:childTnLst>
+                          </p:cTn>
+                        </p:par>
+                      </p:childTnLst>
+                    </p:cTn>
+                  </p:par>
+                  <p:par>
+                    <p:cTn id="27" fill="hold">
+                      <p:stCondLst>
+                        <p:cond delay="indefinite"/>
+                      </p:stCondLst>
+                      <p:childTnLst>
+                        <p:par>
+                          <p:cTn id="28" fill="hold">
+                            <p:stCondLst>
+                              <p:cond delay="0"/>
+                            </p:stCondLst>
+                            <p:childTnLst>
+                              <p:par>
+                                <p:cTn id="29" presetID="10" presetClass="entr" presetSubtype="0" fill="hold" grpId="0" nodeType="clickEffect">
+                                  <p:stCondLst>
+                                    <p:cond delay="0"/>
+                                  </p:stCondLst>
+                                  <p:childTnLst>
+                                    <p:set>
+                                      <p:cBhvr>
+                                        <p:cTn id="30" dur="1" fill="hold">
+                                          <p:stCondLst>
+                                            <p:cond delay="0"/>
+                                          </p:stCondLst>
+                                        </p:cTn>
+                                        <p:tgtEl>
+                                          <p:spTgt spid="3"/>
+                                        </p:tgtEl>
+                                        <p:attrNameLst>
+                                          <p:attrName>style.visibility</p:attrName>
+                                        </p:attrNameLst>
+                                      </p:cBhvr>
+                                      <p:to>
+                                        <p:strVal val="visible"/>
+                                      </p:to>
+                                    </p:set>
+                                    <p:animEffect transition="in" filter="fade">
+                                      <p:cBhvr>
+                                        <p:cTn id="31" dur="500"/>
+                                        <p:tgtEl>
+                                          <p:spTgt spid="3"/>
+                                        </p:tgtEl>
+                                      </p:cBhvr>
+                                    </p:animEffect>
+                                  </p:childTnLst>
+                                </p:cTn>
+                              </p:par>
+                            </p:childTnLst>
+                          </p:cTn>
+                        </p:par>
+                      </p:childTnLst>
+                    </p:cTn>
+                  </p:par>
+                </p:childTnLst>
+              </p:cTn>
+              <p:prevCondLst>
+                <p:cond evt="onPrev" delay="0">
+                  <p:tgtEl>
+                    <p:sldTgt/>
+                  </p:tgtEl>
+                </p:cond>
+              </p:prevCondLst>
+              <p:nextCondLst>
+                <p:cond evt="onNext" delay="0">
+                  <p:tgtEl>
+                    <p:sldTgt/>
+                  </p:tgtEl>
+                </p:cond>
+              </p:nextCondLst>
+            </p:seq>
+          </p:childTnLst>
+        </p:cTn>
+      </p:par>
+    </p:tnLst>
+    <p:bldLst>
+      <p:bldP spid="2" grpId="0"/>
+      <p:bldP spid="21" grpId="0" animBg="1"/>
+      <p:bldP spid="3" grpId="0" animBg="1"/>
+      <p:bldP spid="22" grpId="0"/>
+      <p:bldP spid="23" grpId="0" animBg="1"/>
+      <p:bldP spid="24" grpId="0"/>
+      <p:bldP spid="25" grpId="0" animBg="1"/>
+    </p:bldLst>
+  </p:timing>
 </p:sld>
 </file>
 
@@ -46624,6 +47194,53 @@
           </a:p>
         </p:txBody>
       </p:sp>
+      <p:pic>
+        <p:nvPicPr>
+          <p:cNvPr id="6" name="Picture 2">
+            <a:extLst>
+              <a:ext uri="{FF2B5EF4-FFF2-40B4-BE49-F238E27FC236}">
+                <a16:creationId xmlns:a16="http://schemas.microsoft.com/office/drawing/2014/main" id="{C694EB0C-D9A3-41E0-8A01-5FDB2CC85280}"/>
+              </a:ext>
+            </a:extLst>
+          </p:cNvPr>
+          <p:cNvPicPr>
+            <a:picLocks noChangeAspect="1" noChangeArrowheads="1"/>
+          </p:cNvPicPr>
+          <p:nvPr/>
+        </p:nvPicPr>
+        <p:blipFill>
+          <a:blip r:embed="rId2">
+            <a:extLst>
+              <a:ext uri="{28A0092B-C50C-407E-A947-70E740481C1C}">
+                <a14:useLocalDpi xmlns:a14="http://schemas.microsoft.com/office/drawing/2010/main" val="0"/>
+              </a:ext>
+            </a:extLst>
+          </a:blip>
+          <a:srcRect/>
+          <a:stretch>
+            <a:fillRect/>
+          </a:stretch>
+        </p:blipFill>
+        <p:spPr bwMode="auto">
+          <a:xfrm>
+            <a:off x="2819400" y="3086782"/>
+            <a:ext cx="6553200" cy="3086100"/>
+          </a:xfrm>
+          <a:prstGeom prst="rect">
+            <a:avLst/>
+          </a:prstGeom>
+          <a:noFill/>
+          <a:extLst>
+            <a:ext uri="{909E8E84-426E-40DD-AFC4-6F175D3DCCD1}">
+              <a14:hiddenFill xmlns:a14="http://schemas.microsoft.com/office/drawing/2010/main">
+                <a:solidFill>
+                  <a:srgbClr val="FFFFFF"/>
+                </a:solidFill>
+              </a14:hiddenFill>
+            </a:ext>
+          </a:extLst>
+        </p:spPr>
+      </p:pic>
     </p:spTree>
     <p:extLst>
       <p:ext uri="{BB962C8B-B14F-4D97-AF65-F5344CB8AC3E}">
@@ -46634,6 +47251,89 @@
   <p:clrMapOvr>
     <a:masterClrMapping/>
   </p:clrMapOvr>
+  <p:timing>
+    <p:tnLst>
+      <p:par>
+        <p:cTn id="1" dur="indefinite" restart="never" nodeType="tmRoot">
+          <p:childTnLst>
+            <p:seq concurrent="1" nextAc="seek">
+              <p:cTn id="2" dur="indefinite" nodeType="mainSeq">
+                <p:childTnLst>
+                  <p:par>
+                    <p:cTn id="3" fill="hold">
+                      <p:stCondLst>
+                        <p:cond delay="indefinite"/>
+                      </p:stCondLst>
+                      <p:childTnLst>
+                        <p:par>
+                          <p:cTn id="4" fill="hold">
+                            <p:stCondLst>
+                              <p:cond delay="0"/>
+                            </p:stCondLst>
+                            <p:childTnLst>
+                              <p:par>
+                                <p:cTn id="5" presetID="10" presetClass="entr" presetSubtype="0" fill="hold" nodeType="clickEffect">
+                                  <p:stCondLst>
+                                    <p:cond delay="0"/>
+                                  </p:stCondLst>
+                                  <p:childTnLst>
+                                    <p:set>
+                                      <p:cBhvr>
+                                        <p:cTn id="6" dur="1" fill="hold">
+                                          <p:stCondLst>
+                                            <p:cond delay="0"/>
+                                          </p:stCondLst>
+                                        </p:cTn>
+                                        <p:tgtEl>
+                                          <p:spTgt spid="6"/>
+                                        </p:tgtEl>
+                                        <p:attrNameLst>
+                                          <p:attrName>style.visibility</p:attrName>
+                                        </p:attrNameLst>
+                                      </p:cBhvr>
+                                      <p:to>
+                                        <p:strVal val="visible"/>
+                                      </p:to>
+                                    </p:set>
+                                    <p:animEffect transition="in" filter="fade">
+                                      <p:cBhvr>
+                                        <p:cTn id="7" dur="500"/>
+                                        <p:tgtEl>
+                                          <p:spTgt spid="6"/>
+                                        </p:tgtEl>
+                                      </p:cBhvr>
+                                    </p:animEffect>
+                                  </p:childTnLst>
+                                </p:cTn>
+                              </p:par>
+                            </p:childTnLst>
+                          </p:cTn>
+                        </p:par>
+                      </p:childTnLst>
+                    </p:cTn>
+                  </p:par>
+                </p:childTnLst>
+              </p:cTn>
+              <p:prevCondLst>
+                <p:cond evt="onPrev" delay="0">
+                  <p:tgtEl>
+                    <p:sldTgt/>
+                  </p:tgtEl>
+                </p:cond>
+              </p:prevCondLst>
+              <p:nextCondLst>
+                <p:cond evt="onNext" delay="0">
+                  <p:tgtEl>
+                    <p:sldTgt/>
+                  </p:tgtEl>
+                </p:cond>
+              </p:nextCondLst>
+            </p:seq>
+          </p:childTnLst>
+        </p:cTn>
+      </p:par>
+    </p:tnLst>
+  </p:timing>
 </p:sld>
 </file>
 
@@ -46706,7 +47406,7 @@
           <a:graphicData uri="http://schemas.openxmlformats.org/presentationml/2006/ole">
             <mc:AlternateContent xmlns:mc="http://schemas.openxmlformats.org/markup-compatibility/2006">
               <mc:Choice xmlns:v="urn:schemas-microsoft-com:vml" Requires="v">
-                <p:oleObj spid="_x0000_s4115" name="VISIO" r:id="rId4" imgW="2544803" imgH="251238" progId="Visio.Drawing.5">
+                <p:oleObj spid="_x0000_s4120" name="VISIO" r:id="rId4" imgW="2544803" imgH="251238" progId="Visio.Drawing.5">
                   <p:embed/>
                 </p:oleObj>
               </mc:Choice>
@@ -47116,7 +47816,7 @@
           <a:graphicData uri="http://schemas.openxmlformats.org/presentationml/2006/ole">
             <mc:AlternateContent xmlns:mc="http://schemas.openxmlformats.org/markup-compatibility/2006">
               <mc:Choice xmlns:v="urn:schemas-microsoft-com:vml" Requires="v">
-                <p:oleObj spid="_x0000_s5139" name="VISIO" r:id="rId4" imgW="926280" imgH="750240" progId="Visio.Drawing.5">
+                <p:oleObj spid="_x0000_s5144" name="VISIO" r:id="rId4" imgW="926280" imgH="750240" progId="Visio.Drawing.5">
                   <p:embed/>
                 </p:oleObj>
               </mc:Choice>
@@ -47399,7 +48099,7 @@
           <a:graphicData uri="http://schemas.openxmlformats.org/presentationml/2006/ole">
             <mc:AlternateContent xmlns:mc="http://schemas.openxmlformats.org/markup-compatibility/2006">
               <mc:Choice xmlns:v="urn:schemas-microsoft-com:vml" Requires="v">
-                <p:oleObj spid="_x0000_s6163" name="VISIO" r:id="rId4" imgW="4126680" imgH="2227320" progId="Visio.Drawing.5">
+                <p:oleObj spid="_x0000_s6168" name="VISIO" r:id="rId4" imgW="4126680" imgH="2227320" progId="Visio.Drawing.5">
                   <p:embed/>
                 </p:oleObj>
               </mc:Choice>
@@ -48395,20 +49095,20 @@
 </file>
 
 <file path=customXml/item1.xml><?xml version="1.0" encoding="utf-8"?>
-<p:properties xmlns:p="http://schemas.microsoft.com/office/2006/metadata/properties" xmlns:xsi="http://www.w3.org/2001/XMLSchema-instance" xmlns:pc="http://schemas.microsoft.com/office/infopath/2007/PartnerControls">
-  <documentManagement>
-    <MediaServiceKeyPoints xmlns="71af3243-3dd4-4a8d-8c0d-dd76da1f02a5" xsi:nil="true"/>
-  </documentManagement>
-</p:properties>
-</file>
-
-<file path=customXml/item2.xml><?xml version="1.0" encoding="utf-8"?>
 <?mso-contentType ?>
 <FormTemplates xmlns="http://schemas.microsoft.com/sharepoint/v3/contenttype/forms">
   <Display>DocumentLibraryForm</Display>
   <Edit>DocumentLibraryForm</Edit>
   <New>DocumentLibraryForm</New>
 </FormTemplates>
+</file>
+
+<file path=customXml/item2.xml><?xml version="1.0" encoding="utf-8"?>
+<p:properties xmlns:p="http://schemas.microsoft.com/office/2006/metadata/properties" xmlns:xsi="http://www.w3.org/2001/XMLSchema-instance" xmlns:pc="http://schemas.microsoft.com/office/infopath/2007/PartnerControls">
+  <documentManagement>
+    <MediaServiceKeyPoints xmlns="71af3243-3dd4-4a8d-8c0d-dd76da1f02a5" xsi:nil="true"/>
+  </documentManagement>
+</p:properties>
 </file>
 
 <file path=customXml/item3.xml><?xml version="1.0" encoding="utf-8"?>
@@ -48623,19 +49323,19 @@
 </file>
 
 <file path=customXml/itemProps1.xml><?xml version="1.0" encoding="utf-8"?>
+<ds:datastoreItem xmlns:ds="http://schemas.openxmlformats.org/officeDocument/2006/customXml" ds:itemID="{A68F36FF-D6F8-4F25-B1D6-7893F2294B63}">
+  <ds:schemaRefs>
+    <ds:schemaRef ds:uri="http://schemas.microsoft.com/sharepoint/v3/contenttype/forms"/>
+  </ds:schemaRefs>
+</ds:datastoreItem>
+</file>
+
+<file path=customXml/itemProps2.xml><?xml version="1.0" encoding="utf-8"?>
 <ds:datastoreItem xmlns:ds="http://schemas.openxmlformats.org/officeDocument/2006/customXml" ds:itemID="{7BED6A94-6CEC-4690-B5D0-3E831BCC769C}">
   <ds:schemaRefs>
     <ds:schemaRef ds:uri="http://schemas.microsoft.com/office/2006/metadata/properties"/>
     <ds:schemaRef ds:uri="http://schemas.microsoft.com/office/infopath/2007/PartnerControls"/>
     <ds:schemaRef ds:uri="71af3243-3dd4-4a8d-8c0d-dd76da1f02a5"/>
-  </ds:schemaRefs>
-</ds:datastoreItem>
-</file>
-
-<file path=customXml/itemProps2.xml><?xml version="1.0" encoding="utf-8"?>
-<ds:datastoreItem xmlns:ds="http://schemas.openxmlformats.org/officeDocument/2006/customXml" ds:itemID="{A68F36FF-D6F8-4F25-B1D6-7893F2294B63}">
-  <ds:schemaRefs>
-    <ds:schemaRef ds:uri="http://schemas.microsoft.com/sharepoint/v3/contenttype/forms"/>
   </ds:schemaRefs>
 </ds:datastoreItem>
 </file>

</xml_diff>